<commit_message>
Increasing hand size and filling it
</commit_message>
<xml_diff>
--- a/Texture.pptx
+++ b/Texture.pptx
@@ -104,6 +104,11 @@
       </a:defRPr>
     </a:lvl9pPr>
   </p:defaultTextStyle>
+  <p:extLst>
+    <p:ext uri="{EFAFB233-063F-42B5-8137-9DF3F51BA10A}">
+      <p15:sldGuideLst xmlns:p15="http://schemas.microsoft.com/office/powerpoint/2012/main"/>
+    </p:ext>
+  </p:extLst>
 </p:presentation>
 </file>
 
@@ -254,7 +259,7 @@
           <a:p>
             <a:fld id="{4F39CA0E-E24C-46B9-BDEB-00D69BD4C068}" type="datetimeFigureOut">
               <a:rPr lang="fr-FR" smtClean="0"/>
-              <a:t>01/07/2021</a:t>
+              <a:t>05/07/2021</a:t>
             </a:fld>
             <a:endParaRPr lang="fr-FR"/>
           </a:p>
@@ -452,7 +457,7 @@
           <a:p>
             <a:fld id="{4F39CA0E-E24C-46B9-BDEB-00D69BD4C068}" type="datetimeFigureOut">
               <a:rPr lang="fr-FR" smtClean="0"/>
-              <a:t>01/07/2021</a:t>
+              <a:t>05/07/2021</a:t>
             </a:fld>
             <a:endParaRPr lang="fr-FR"/>
           </a:p>
@@ -660,7 +665,7 @@
           <a:p>
             <a:fld id="{4F39CA0E-E24C-46B9-BDEB-00D69BD4C068}" type="datetimeFigureOut">
               <a:rPr lang="fr-FR" smtClean="0"/>
-              <a:t>01/07/2021</a:t>
+              <a:t>05/07/2021</a:t>
             </a:fld>
             <a:endParaRPr lang="fr-FR"/>
           </a:p>
@@ -858,7 +863,7 @@
           <a:p>
             <a:fld id="{4F39CA0E-E24C-46B9-BDEB-00D69BD4C068}" type="datetimeFigureOut">
               <a:rPr lang="fr-FR" smtClean="0"/>
-              <a:t>01/07/2021</a:t>
+              <a:t>05/07/2021</a:t>
             </a:fld>
             <a:endParaRPr lang="fr-FR"/>
           </a:p>
@@ -1133,7 +1138,7 @@
           <a:p>
             <a:fld id="{4F39CA0E-E24C-46B9-BDEB-00D69BD4C068}" type="datetimeFigureOut">
               <a:rPr lang="fr-FR" smtClean="0"/>
-              <a:t>01/07/2021</a:t>
+              <a:t>05/07/2021</a:t>
             </a:fld>
             <a:endParaRPr lang="fr-FR"/>
           </a:p>
@@ -1398,7 +1403,7 @@
           <a:p>
             <a:fld id="{4F39CA0E-E24C-46B9-BDEB-00D69BD4C068}" type="datetimeFigureOut">
               <a:rPr lang="fr-FR" smtClean="0"/>
-              <a:t>01/07/2021</a:t>
+              <a:t>05/07/2021</a:t>
             </a:fld>
             <a:endParaRPr lang="fr-FR"/>
           </a:p>
@@ -1810,7 +1815,7 @@
           <a:p>
             <a:fld id="{4F39CA0E-E24C-46B9-BDEB-00D69BD4C068}" type="datetimeFigureOut">
               <a:rPr lang="fr-FR" smtClean="0"/>
-              <a:t>01/07/2021</a:t>
+              <a:t>05/07/2021</a:t>
             </a:fld>
             <a:endParaRPr lang="fr-FR"/>
           </a:p>
@@ -1951,7 +1956,7 @@
           <a:p>
             <a:fld id="{4F39CA0E-E24C-46B9-BDEB-00D69BD4C068}" type="datetimeFigureOut">
               <a:rPr lang="fr-FR" smtClean="0"/>
-              <a:t>01/07/2021</a:t>
+              <a:t>05/07/2021</a:t>
             </a:fld>
             <a:endParaRPr lang="fr-FR"/>
           </a:p>
@@ -2064,7 +2069,7 @@
           <a:p>
             <a:fld id="{4F39CA0E-E24C-46B9-BDEB-00D69BD4C068}" type="datetimeFigureOut">
               <a:rPr lang="fr-FR" smtClean="0"/>
-              <a:t>01/07/2021</a:t>
+              <a:t>05/07/2021</a:t>
             </a:fld>
             <a:endParaRPr lang="fr-FR"/>
           </a:p>
@@ -2375,7 +2380,7 @@
           <a:p>
             <a:fld id="{4F39CA0E-E24C-46B9-BDEB-00D69BD4C068}" type="datetimeFigureOut">
               <a:rPr lang="fr-FR" smtClean="0"/>
-              <a:t>01/07/2021</a:t>
+              <a:t>05/07/2021</a:t>
             </a:fld>
             <a:endParaRPr lang="fr-FR"/>
           </a:p>
@@ -2663,7 +2668,7 @@
           <a:p>
             <a:fld id="{4F39CA0E-E24C-46B9-BDEB-00D69BD4C068}" type="datetimeFigureOut">
               <a:rPr lang="fr-FR" smtClean="0"/>
-              <a:t>01/07/2021</a:t>
+              <a:t>05/07/2021</a:t>
             </a:fld>
             <a:endParaRPr lang="fr-FR"/>
           </a:p>
@@ -2904,7 +2909,7 @@
           <a:p>
             <a:fld id="{4F39CA0E-E24C-46B9-BDEB-00D69BD4C068}" type="datetimeFigureOut">
               <a:rPr lang="fr-FR" smtClean="0"/>
-              <a:t>01/07/2021</a:t>
+              <a:t>05/07/2021</a:t>
             </a:fld>
             <a:endParaRPr lang="fr-FR"/>
           </a:p>
@@ -3829,6 +3834,135 @@
           </p:txBody>
         </p:sp>
       </p:grpSp>
+      <p:grpSp>
+        <p:nvGrpSpPr>
+          <p:cNvPr id="3" name="Groupe 2">
+            <a:extLst>
+              <a:ext uri="{FF2B5EF4-FFF2-40B4-BE49-F238E27FC236}">
+                <a16:creationId xmlns:a16="http://schemas.microsoft.com/office/drawing/2014/main" id="{1D0ED6C8-2C09-405E-9575-AE2B72D00E3A}"/>
+              </a:ext>
+            </a:extLst>
+          </p:cNvPr>
+          <p:cNvGrpSpPr/>
+          <p:nvPr/>
+        </p:nvGrpSpPr>
+        <p:grpSpPr>
+          <a:xfrm>
+            <a:off x="3096985" y="4288079"/>
+            <a:ext cx="1743891" cy="1743891"/>
+            <a:chOff x="3096985" y="4288079"/>
+            <a:chExt cx="1743891" cy="1743891"/>
+          </a:xfrm>
+        </p:grpSpPr>
+        <p:sp>
+          <p:nvSpPr>
+            <p:cNvPr id="17" name="Rectangle 16">
+              <a:extLst>
+                <a:ext uri="{FF2B5EF4-FFF2-40B4-BE49-F238E27FC236}">
+                  <a16:creationId xmlns:a16="http://schemas.microsoft.com/office/drawing/2014/main" id="{7DF91B8B-C4EE-4E73-ACF7-7984CF7EB4D1}"/>
+                </a:ext>
+              </a:extLst>
+            </p:cNvPr>
+            <p:cNvSpPr/>
+            <p:nvPr/>
+          </p:nvSpPr>
+          <p:spPr>
+            <a:xfrm>
+              <a:off x="3096985" y="4288079"/>
+              <a:ext cx="1743891" cy="1743891"/>
+            </a:xfrm>
+            <a:prstGeom prst="rect">
+              <a:avLst/>
+            </a:prstGeom>
+            <a:solidFill>
+              <a:schemeClr val="tx1"/>
+            </a:solidFill>
+            <a:ln>
+              <a:noFill/>
+            </a:ln>
+          </p:spPr>
+          <p:style>
+            <a:lnRef idx="2">
+              <a:schemeClr val="accent1">
+                <a:shade val="50000"/>
+              </a:schemeClr>
+            </a:lnRef>
+            <a:fillRef idx="1">
+              <a:schemeClr val="accent1"/>
+            </a:fillRef>
+            <a:effectRef idx="0">
+              <a:schemeClr val="accent1"/>
+            </a:effectRef>
+            <a:fontRef idx="minor">
+              <a:schemeClr val="lt1"/>
+            </a:fontRef>
+          </p:style>
+          <p:txBody>
+            <a:bodyPr rtlCol="0" anchor="ctr"/>
+            <a:lstStyle/>
+            <a:p>
+              <a:pPr algn="ctr"/>
+              <a:endParaRPr lang="fr-FR"/>
+            </a:p>
+          </p:txBody>
+        </p:sp>
+        <p:sp>
+          <p:nvSpPr>
+            <p:cNvPr id="2" name="Croix 1">
+              <a:extLst>
+                <a:ext uri="{FF2B5EF4-FFF2-40B4-BE49-F238E27FC236}">
+                  <a16:creationId xmlns:a16="http://schemas.microsoft.com/office/drawing/2014/main" id="{F15A5F12-D792-4110-A119-15FDA94ECF70}"/>
+                </a:ext>
+              </a:extLst>
+            </p:cNvPr>
+            <p:cNvSpPr/>
+            <p:nvPr/>
+          </p:nvSpPr>
+          <p:spPr>
+            <a:xfrm>
+              <a:off x="3717442" y="4907601"/>
+              <a:ext cx="502977" cy="504846"/>
+            </a:xfrm>
+            <a:prstGeom prst="plus">
+              <a:avLst>
+                <a:gd name="adj" fmla="val 39622"/>
+              </a:avLst>
+            </a:prstGeom>
+            <a:solidFill>
+              <a:schemeClr val="bg1"/>
+            </a:solidFill>
+            <a:ln>
+              <a:solidFill>
+                <a:schemeClr val="bg1"/>
+              </a:solidFill>
+            </a:ln>
+          </p:spPr>
+          <p:style>
+            <a:lnRef idx="2">
+              <a:schemeClr val="accent1">
+                <a:shade val="50000"/>
+              </a:schemeClr>
+            </a:lnRef>
+            <a:fillRef idx="1">
+              <a:schemeClr val="accent1"/>
+            </a:fillRef>
+            <a:effectRef idx="0">
+              <a:schemeClr val="accent1"/>
+            </a:effectRef>
+            <a:fontRef idx="minor">
+              <a:schemeClr val="lt1"/>
+            </a:fontRef>
+          </p:style>
+          <p:txBody>
+            <a:bodyPr rtlCol="0" anchor="ctr"/>
+            <a:lstStyle/>
+            <a:p>
+              <a:pPr algn="ctr"/>
+              <a:endParaRPr lang="fr-FR"/>
+            </a:p>
+          </p:txBody>
+        </p:sp>
+      </p:grpSp>
     </p:spTree>
     <p:extLst>
       <p:ext uri="{BB962C8B-B14F-4D97-AF65-F5344CB8AC3E}">

</xml_diff>

<commit_message>
Fixing rotation of camera and plane towards pin. Changing plane over pin by a flat cylinder to prevent corner projection of plane.
</commit_message>
<xml_diff>
--- a/Texture.pptx
+++ b/Texture.pptx
@@ -6,8 +6,10 @@
   </p:sldMasterIdLst>
   <p:sldIdLst>
     <p:sldId id="256" r:id="rId2"/>
-    <p:sldId id="257" r:id="rId3"/>
-    <p:sldId id="258" r:id="rId4"/>
+    <p:sldId id="260" r:id="rId3"/>
+    <p:sldId id="259" r:id="rId4"/>
+    <p:sldId id="257" r:id="rId5"/>
+    <p:sldId id="258" r:id="rId6"/>
   </p:sldIdLst>
   <p:sldSz cx="12192000" cy="6858000"/>
   <p:notesSz cx="6858000" cy="9144000"/>
@@ -273,7 +275,7 @@
           <a:p>
             <a:fld id="{4F39CA0E-E24C-46B9-BDEB-00D69BD4C068}" type="datetimeFigureOut">
               <a:rPr lang="fr-FR" smtClean="0"/>
-              <a:t>19/07/2021</a:t>
+              <a:t>26/07/2021</a:t>
             </a:fld>
             <a:endParaRPr lang="fr-FR"/>
           </a:p>
@@ -471,7 +473,7 @@
           <a:p>
             <a:fld id="{4F39CA0E-E24C-46B9-BDEB-00D69BD4C068}" type="datetimeFigureOut">
               <a:rPr lang="fr-FR" smtClean="0"/>
-              <a:t>19/07/2021</a:t>
+              <a:t>26/07/2021</a:t>
             </a:fld>
             <a:endParaRPr lang="fr-FR"/>
           </a:p>
@@ -679,7 +681,7 @@
           <a:p>
             <a:fld id="{4F39CA0E-E24C-46B9-BDEB-00D69BD4C068}" type="datetimeFigureOut">
               <a:rPr lang="fr-FR" smtClean="0"/>
-              <a:t>19/07/2021</a:t>
+              <a:t>26/07/2021</a:t>
             </a:fld>
             <a:endParaRPr lang="fr-FR"/>
           </a:p>
@@ -877,7 +879,7 @@
           <a:p>
             <a:fld id="{4F39CA0E-E24C-46B9-BDEB-00D69BD4C068}" type="datetimeFigureOut">
               <a:rPr lang="fr-FR" smtClean="0"/>
-              <a:t>19/07/2021</a:t>
+              <a:t>26/07/2021</a:t>
             </a:fld>
             <a:endParaRPr lang="fr-FR"/>
           </a:p>
@@ -1152,7 +1154,7 @@
           <a:p>
             <a:fld id="{4F39CA0E-E24C-46B9-BDEB-00D69BD4C068}" type="datetimeFigureOut">
               <a:rPr lang="fr-FR" smtClean="0"/>
-              <a:t>19/07/2021</a:t>
+              <a:t>26/07/2021</a:t>
             </a:fld>
             <a:endParaRPr lang="fr-FR"/>
           </a:p>
@@ -1417,7 +1419,7 @@
           <a:p>
             <a:fld id="{4F39CA0E-E24C-46B9-BDEB-00D69BD4C068}" type="datetimeFigureOut">
               <a:rPr lang="fr-FR" smtClean="0"/>
-              <a:t>19/07/2021</a:t>
+              <a:t>26/07/2021</a:t>
             </a:fld>
             <a:endParaRPr lang="fr-FR"/>
           </a:p>
@@ -1829,7 +1831,7 @@
           <a:p>
             <a:fld id="{4F39CA0E-E24C-46B9-BDEB-00D69BD4C068}" type="datetimeFigureOut">
               <a:rPr lang="fr-FR" smtClean="0"/>
-              <a:t>19/07/2021</a:t>
+              <a:t>26/07/2021</a:t>
             </a:fld>
             <a:endParaRPr lang="fr-FR"/>
           </a:p>
@@ -1970,7 +1972,7 @@
           <a:p>
             <a:fld id="{4F39CA0E-E24C-46B9-BDEB-00D69BD4C068}" type="datetimeFigureOut">
               <a:rPr lang="fr-FR" smtClean="0"/>
-              <a:t>19/07/2021</a:t>
+              <a:t>26/07/2021</a:t>
             </a:fld>
             <a:endParaRPr lang="fr-FR"/>
           </a:p>
@@ -2083,7 +2085,7 @@
           <a:p>
             <a:fld id="{4F39CA0E-E24C-46B9-BDEB-00D69BD4C068}" type="datetimeFigureOut">
               <a:rPr lang="fr-FR" smtClean="0"/>
-              <a:t>19/07/2021</a:t>
+              <a:t>26/07/2021</a:t>
             </a:fld>
             <a:endParaRPr lang="fr-FR"/>
           </a:p>
@@ -2394,7 +2396,7 @@
           <a:p>
             <a:fld id="{4F39CA0E-E24C-46B9-BDEB-00D69BD4C068}" type="datetimeFigureOut">
               <a:rPr lang="fr-FR" smtClean="0"/>
-              <a:t>19/07/2021</a:t>
+              <a:t>26/07/2021</a:t>
             </a:fld>
             <a:endParaRPr lang="fr-FR"/>
           </a:p>
@@ -2682,7 +2684,7 @@
           <a:p>
             <a:fld id="{4F39CA0E-E24C-46B9-BDEB-00D69BD4C068}" type="datetimeFigureOut">
               <a:rPr lang="fr-FR" smtClean="0"/>
-              <a:t>19/07/2021</a:t>
+              <a:t>26/07/2021</a:t>
             </a:fld>
             <a:endParaRPr lang="fr-FR"/>
           </a:p>
@@ -2923,7 +2925,7 @@
           <a:p>
             <a:fld id="{4F39CA0E-E24C-46B9-BDEB-00D69BD4C068}" type="datetimeFigureOut">
               <a:rPr lang="fr-FR" smtClean="0"/>
-              <a:t>19/07/2021</a:t>
+              <a:t>26/07/2021</a:t>
             </a:fld>
             <a:endParaRPr lang="fr-FR"/>
           </a:p>
@@ -3324,6 +3326,312 @@
 </file>
 
 <file path=ppt/slides/slide1.xml><?xml version="1.0" encoding="utf-8"?>
+<p:sld xmlns:a="http://schemas.openxmlformats.org/drawingml/2006/main" xmlns:r="http://schemas.openxmlformats.org/officeDocument/2006/relationships" xmlns:p="http://schemas.openxmlformats.org/presentationml/2006/main">
+  <p:cSld>
+    <p:spTree>
+      <p:nvGrpSpPr>
+        <p:cNvPr id="1" name=""/>
+        <p:cNvGrpSpPr/>
+        <p:nvPr/>
+      </p:nvGrpSpPr>
+      <p:grpSpPr>
+        <a:xfrm>
+          <a:off x="0" y="0"/>
+          <a:ext cx="0" cy="0"/>
+          <a:chOff x="0" y="0"/>
+          <a:chExt cx="0" cy="0"/>
+        </a:xfrm>
+      </p:grpSpPr>
+      <p:grpSp>
+        <p:nvGrpSpPr>
+          <p:cNvPr id="13" name="Groupe 12">
+            <a:extLst>
+              <a:ext uri="{FF2B5EF4-FFF2-40B4-BE49-F238E27FC236}">
+                <a16:creationId xmlns:a16="http://schemas.microsoft.com/office/drawing/2014/main" id="{246B2228-64E0-469B-9B8F-3E698BA5D3E2}"/>
+              </a:ext>
+            </a:extLst>
+          </p:cNvPr>
+          <p:cNvGrpSpPr/>
+          <p:nvPr/>
+        </p:nvGrpSpPr>
+        <p:grpSpPr>
+          <a:xfrm>
+            <a:off x="2426201" y="254762"/>
+            <a:ext cx="3600000" cy="3600000"/>
+            <a:chOff x="2426201" y="254762"/>
+            <a:chExt cx="3600000" cy="3600000"/>
+          </a:xfrm>
+        </p:grpSpPr>
+        <p:sp>
+          <p:nvSpPr>
+            <p:cNvPr id="5" name="Rectangle 4">
+              <a:extLst>
+                <a:ext uri="{FF2B5EF4-FFF2-40B4-BE49-F238E27FC236}">
+                  <a16:creationId xmlns:a16="http://schemas.microsoft.com/office/drawing/2014/main" id="{28BD533B-0F9A-4729-9C32-71BE87F5F14D}"/>
+                </a:ext>
+              </a:extLst>
+            </p:cNvPr>
+            <p:cNvSpPr/>
+            <p:nvPr/>
+          </p:nvSpPr>
+          <p:spPr>
+            <a:xfrm>
+              <a:off x="2426201" y="254762"/>
+              <a:ext cx="3600000" cy="3600000"/>
+            </a:xfrm>
+            <a:prstGeom prst="rect">
+              <a:avLst/>
+            </a:prstGeom>
+            <a:noFill/>
+            <a:ln>
+              <a:noFill/>
+            </a:ln>
+          </p:spPr>
+          <p:style>
+            <a:lnRef idx="2">
+              <a:schemeClr val="accent1">
+                <a:shade val="50000"/>
+              </a:schemeClr>
+            </a:lnRef>
+            <a:fillRef idx="1">
+              <a:schemeClr val="accent1"/>
+            </a:fillRef>
+            <a:effectRef idx="0">
+              <a:schemeClr val="accent1"/>
+            </a:effectRef>
+            <a:fontRef idx="minor">
+              <a:schemeClr val="lt1"/>
+            </a:fontRef>
+          </p:style>
+          <p:txBody>
+            <a:bodyPr rtlCol="0" anchor="ctr"/>
+            <a:lstStyle/>
+            <a:p>
+              <a:pPr algn="ctr"/>
+              <a:endParaRPr lang="fr-FR"/>
+            </a:p>
+          </p:txBody>
+        </p:sp>
+        <p:sp>
+          <p:nvSpPr>
+            <p:cNvPr id="7" name="Ellipse 6">
+              <a:extLst>
+                <a:ext uri="{FF2B5EF4-FFF2-40B4-BE49-F238E27FC236}">
+                  <a16:creationId xmlns:a16="http://schemas.microsoft.com/office/drawing/2014/main" id="{442CDAB6-25FB-4C60-B631-E98E53F42F2D}"/>
+                </a:ext>
+              </a:extLst>
+            </p:cNvPr>
+            <p:cNvSpPr/>
+            <p:nvPr/>
+          </p:nvSpPr>
+          <p:spPr>
+            <a:xfrm>
+              <a:off x="3686201" y="1514762"/>
+              <a:ext cx="1080001" cy="1080001"/>
+            </a:xfrm>
+            <a:prstGeom prst="ellipse">
+              <a:avLst/>
+            </a:prstGeom>
+            <a:noFill/>
+            <a:ln w="76200">
+              <a:solidFill>
+                <a:schemeClr val="bg1"/>
+              </a:solidFill>
+            </a:ln>
+          </p:spPr>
+          <p:style>
+            <a:lnRef idx="2">
+              <a:schemeClr val="accent1">
+                <a:shade val="50000"/>
+              </a:schemeClr>
+            </a:lnRef>
+            <a:fillRef idx="1">
+              <a:schemeClr val="accent1"/>
+            </a:fillRef>
+            <a:effectRef idx="0">
+              <a:schemeClr val="accent1"/>
+            </a:effectRef>
+            <a:fontRef idx="minor">
+              <a:schemeClr val="lt1"/>
+            </a:fontRef>
+          </p:style>
+          <p:txBody>
+            <a:bodyPr rtlCol="0" anchor="ctr"/>
+            <a:lstStyle/>
+            <a:p>
+              <a:pPr algn="ctr"/>
+              <a:endParaRPr lang="fr-FR"/>
+            </a:p>
+          </p:txBody>
+        </p:sp>
+      </p:grpSp>
+    </p:spTree>
+    <p:extLst>
+      <p:ext uri="{BB962C8B-B14F-4D97-AF65-F5344CB8AC3E}">
+        <p14:creationId xmlns:p14="http://schemas.microsoft.com/office/powerpoint/2010/main" val="4122987937"/>
+      </p:ext>
+    </p:extLst>
+  </p:cSld>
+  <p:clrMapOvr>
+    <a:masterClrMapping/>
+  </p:clrMapOvr>
+</p:sld>
+</file>
+
+<file path=ppt/slides/slide2.xml><?xml version="1.0" encoding="utf-8"?>
+<p:sld xmlns:a="http://schemas.openxmlformats.org/drawingml/2006/main" xmlns:r="http://schemas.openxmlformats.org/officeDocument/2006/relationships" xmlns:p="http://schemas.openxmlformats.org/presentationml/2006/main">
+  <p:cSld>
+    <p:spTree>
+      <p:nvGrpSpPr>
+        <p:cNvPr id="1" name=""/>
+        <p:cNvGrpSpPr/>
+        <p:nvPr/>
+      </p:nvGrpSpPr>
+      <p:grpSpPr>
+        <a:xfrm>
+          <a:off x="0" y="0"/>
+          <a:ext cx="0" cy="0"/>
+          <a:chOff x="0" y="0"/>
+          <a:chExt cx="0" cy="0"/>
+        </a:xfrm>
+      </p:grpSpPr>
+      <p:grpSp>
+        <p:nvGrpSpPr>
+          <p:cNvPr id="3" name="Groupe 2">
+            <a:extLst>
+              <a:ext uri="{FF2B5EF4-FFF2-40B4-BE49-F238E27FC236}">
+                <a16:creationId xmlns:a16="http://schemas.microsoft.com/office/drawing/2014/main" id="{57FCEABF-72AF-47FA-BF6E-7E2320FF9885}"/>
+              </a:ext>
+            </a:extLst>
+          </p:cNvPr>
+          <p:cNvGrpSpPr/>
+          <p:nvPr/>
+        </p:nvGrpSpPr>
+        <p:grpSpPr>
+          <a:xfrm>
+            <a:off x="2246201" y="74761"/>
+            <a:ext cx="3600000" cy="3600000"/>
+            <a:chOff x="2246201" y="74761"/>
+            <a:chExt cx="3600000" cy="3600000"/>
+          </a:xfrm>
+        </p:grpSpPr>
+        <p:sp>
+          <p:nvSpPr>
+            <p:cNvPr id="5" name="Rectangle 4">
+              <a:extLst>
+                <a:ext uri="{FF2B5EF4-FFF2-40B4-BE49-F238E27FC236}">
+                  <a16:creationId xmlns:a16="http://schemas.microsoft.com/office/drawing/2014/main" id="{28BD533B-0F9A-4729-9C32-71BE87F5F14D}"/>
+                </a:ext>
+              </a:extLst>
+            </p:cNvPr>
+            <p:cNvSpPr/>
+            <p:nvPr/>
+          </p:nvSpPr>
+          <p:spPr>
+            <a:xfrm>
+              <a:off x="2246201" y="74761"/>
+              <a:ext cx="3600000" cy="3600000"/>
+            </a:xfrm>
+            <a:prstGeom prst="rect">
+              <a:avLst/>
+            </a:prstGeom>
+            <a:noFill/>
+            <a:ln>
+              <a:noFill/>
+            </a:ln>
+          </p:spPr>
+          <p:style>
+            <a:lnRef idx="2">
+              <a:schemeClr val="accent1">
+                <a:shade val="50000"/>
+              </a:schemeClr>
+            </a:lnRef>
+            <a:fillRef idx="1">
+              <a:schemeClr val="accent1"/>
+            </a:fillRef>
+            <a:effectRef idx="0">
+              <a:schemeClr val="accent1"/>
+            </a:effectRef>
+            <a:fontRef idx="minor">
+              <a:schemeClr val="lt1"/>
+            </a:fontRef>
+          </p:style>
+          <p:txBody>
+            <a:bodyPr rtlCol="0" anchor="ctr"/>
+            <a:lstStyle/>
+            <a:p>
+              <a:pPr algn="ctr"/>
+              <a:endParaRPr lang="fr-FR"/>
+            </a:p>
+          </p:txBody>
+        </p:sp>
+        <p:sp>
+          <p:nvSpPr>
+            <p:cNvPr id="63" name="Ellipse 62">
+              <a:extLst>
+                <a:ext uri="{FF2B5EF4-FFF2-40B4-BE49-F238E27FC236}">
+                  <a16:creationId xmlns:a16="http://schemas.microsoft.com/office/drawing/2014/main" id="{47ADF913-0694-41F1-9455-A8FAC60214AE}"/>
+                </a:ext>
+              </a:extLst>
+            </p:cNvPr>
+            <p:cNvSpPr/>
+            <p:nvPr/>
+          </p:nvSpPr>
+          <p:spPr>
+            <a:xfrm>
+              <a:off x="3866201" y="1694761"/>
+              <a:ext cx="360000" cy="360000"/>
+            </a:xfrm>
+            <a:prstGeom prst="ellipse">
+              <a:avLst/>
+            </a:prstGeom>
+            <a:solidFill>
+              <a:schemeClr val="bg1"/>
+            </a:solidFill>
+            <a:ln w="38100">
+              <a:noFill/>
+            </a:ln>
+          </p:spPr>
+          <p:style>
+            <a:lnRef idx="2">
+              <a:schemeClr val="accent1">
+                <a:shade val="50000"/>
+              </a:schemeClr>
+            </a:lnRef>
+            <a:fillRef idx="1">
+              <a:schemeClr val="accent1"/>
+            </a:fillRef>
+            <a:effectRef idx="0">
+              <a:schemeClr val="accent1"/>
+            </a:effectRef>
+            <a:fontRef idx="minor">
+              <a:schemeClr val="lt1"/>
+            </a:fontRef>
+          </p:style>
+          <p:txBody>
+            <a:bodyPr rtlCol="0" anchor="ctr"/>
+            <a:lstStyle/>
+            <a:p>
+              <a:pPr algn="ctr"/>
+              <a:endParaRPr lang="fr-FR" dirty="0"/>
+            </a:p>
+          </p:txBody>
+        </p:sp>
+      </p:grpSp>
+    </p:spTree>
+    <p:extLst>
+      <p:ext uri="{BB962C8B-B14F-4D97-AF65-F5344CB8AC3E}">
+        <p14:creationId xmlns:p14="http://schemas.microsoft.com/office/powerpoint/2010/main" val="3244148125"/>
+      </p:ext>
+    </p:extLst>
+  </p:cSld>
+  <p:clrMapOvr>
+    <a:masterClrMapping/>
+  </p:clrMapOvr>
+</p:sld>
+</file>
+
+<file path=ppt/slides/slide3.xml><?xml version="1.0" encoding="utf-8"?>
 <p:sld xmlns:a="http://schemas.openxmlformats.org/drawingml/2006/main" xmlns:r="http://schemas.openxmlformats.org/officeDocument/2006/relationships" xmlns:p="http://schemas.openxmlformats.org/presentationml/2006/main">
   <p:cSld>
     <p:spTree>
@@ -5227,7 +5535,7 @@
     </p:spTree>
     <p:extLst>
       <p:ext uri="{BB962C8B-B14F-4D97-AF65-F5344CB8AC3E}">
-        <p14:creationId xmlns:p14="http://schemas.microsoft.com/office/powerpoint/2010/main" val="4122987937"/>
+        <p14:creationId xmlns:p14="http://schemas.microsoft.com/office/powerpoint/2010/main" val="3068740513"/>
       </p:ext>
     </p:extLst>
   </p:cSld>
@@ -5237,7 +5545,7 @@
 </p:sld>
 </file>
 
-<file path=ppt/slides/slide2.xml><?xml version="1.0" encoding="utf-8"?>
+<file path=ppt/slides/slide4.xml><?xml version="1.0" encoding="utf-8"?>
 <p:sld xmlns:a="http://schemas.openxmlformats.org/drawingml/2006/main" xmlns:r="http://schemas.openxmlformats.org/officeDocument/2006/relationships" xmlns:p="http://schemas.openxmlformats.org/presentationml/2006/main">
   <p:cSld>
     <p:spTree>
@@ -5799,7 +6107,7 @@
 </p:sld>
 </file>
 
-<file path=ppt/slides/slide3.xml><?xml version="1.0" encoding="utf-8"?>
+<file path=ppt/slides/slide5.xml><?xml version="1.0" encoding="utf-8"?>
 <p:sld xmlns:a="http://schemas.openxmlformats.org/drawingml/2006/main" xmlns:r="http://schemas.openxmlformats.org/officeDocument/2006/relationships" xmlns:p="http://schemas.openxmlformats.org/presentationml/2006/main">
   <p:cSld>
     <p:spTree>

</xml_diff>

<commit_message>
Fixing XP1 PART2 et fine tuning STATE FEEDBACK
</commit_message>
<xml_diff>
--- a/Texture.pptx
+++ b/Texture.pptx
@@ -125,6 +125,13 @@
       </p:ext>
     </p:extLst>
   </p:cmAuthor>
+  <p:cmAuthor id="2" name="Maxime DANIEL" initials="MD [2]" lastIdx="1" clrIdx="1">
+    <p:extLst>
+      <p:ext uri="{19B8F6BF-5375-455C-9EA6-DF929625EA0E}">
+        <p15:presenceInfo xmlns:p15="http://schemas.microsoft.com/office/powerpoint/2012/main" userId="S::m.daniel@estia.fr::592bbd2f-4ac8-4f7d-a622-66a3b0015ed4" providerId="AD"/>
+      </p:ext>
+    </p:extLst>
+  </p:cmAuthor>
 </p:cmAuthorLst>
 </file>
 
@@ -275,7 +282,7 @@
           <a:p>
             <a:fld id="{4F39CA0E-E24C-46B9-BDEB-00D69BD4C068}" type="datetimeFigureOut">
               <a:rPr lang="fr-FR" smtClean="0"/>
-              <a:t>26/07/2021</a:t>
+              <a:t>29/07/2021</a:t>
             </a:fld>
             <a:endParaRPr lang="fr-FR"/>
           </a:p>
@@ -473,7 +480,7 @@
           <a:p>
             <a:fld id="{4F39CA0E-E24C-46B9-BDEB-00D69BD4C068}" type="datetimeFigureOut">
               <a:rPr lang="fr-FR" smtClean="0"/>
-              <a:t>26/07/2021</a:t>
+              <a:t>29/07/2021</a:t>
             </a:fld>
             <a:endParaRPr lang="fr-FR"/>
           </a:p>
@@ -681,7 +688,7 @@
           <a:p>
             <a:fld id="{4F39CA0E-E24C-46B9-BDEB-00D69BD4C068}" type="datetimeFigureOut">
               <a:rPr lang="fr-FR" smtClean="0"/>
-              <a:t>26/07/2021</a:t>
+              <a:t>29/07/2021</a:t>
             </a:fld>
             <a:endParaRPr lang="fr-FR"/>
           </a:p>
@@ -879,7 +886,7 @@
           <a:p>
             <a:fld id="{4F39CA0E-E24C-46B9-BDEB-00D69BD4C068}" type="datetimeFigureOut">
               <a:rPr lang="fr-FR" smtClean="0"/>
-              <a:t>26/07/2021</a:t>
+              <a:t>29/07/2021</a:t>
             </a:fld>
             <a:endParaRPr lang="fr-FR"/>
           </a:p>
@@ -1154,7 +1161,7 @@
           <a:p>
             <a:fld id="{4F39CA0E-E24C-46B9-BDEB-00D69BD4C068}" type="datetimeFigureOut">
               <a:rPr lang="fr-FR" smtClean="0"/>
-              <a:t>26/07/2021</a:t>
+              <a:t>29/07/2021</a:t>
             </a:fld>
             <a:endParaRPr lang="fr-FR"/>
           </a:p>
@@ -1419,7 +1426,7 @@
           <a:p>
             <a:fld id="{4F39CA0E-E24C-46B9-BDEB-00D69BD4C068}" type="datetimeFigureOut">
               <a:rPr lang="fr-FR" smtClean="0"/>
-              <a:t>26/07/2021</a:t>
+              <a:t>29/07/2021</a:t>
             </a:fld>
             <a:endParaRPr lang="fr-FR"/>
           </a:p>
@@ -1831,7 +1838,7 @@
           <a:p>
             <a:fld id="{4F39CA0E-E24C-46B9-BDEB-00D69BD4C068}" type="datetimeFigureOut">
               <a:rPr lang="fr-FR" smtClean="0"/>
-              <a:t>26/07/2021</a:t>
+              <a:t>29/07/2021</a:t>
             </a:fld>
             <a:endParaRPr lang="fr-FR"/>
           </a:p>
@@ -1972,7 +1979,7 @@
           <a:p>
             <a:fld id="{4F39CA0E-E24C-46B9-BDEB-00D69BD4C068}" type="datetimeFigureOut">
               <a:rPr lang="fr-FR" smtClean="0"/>
-              <a:t>26/07/2021</a:t>
+              <a:t>29/07/2021</a:t>
             </a:fld>
             <a:endParaRPr lang="fr-FR"/>
           </a:p>
@@ -2085,7 +2092,7 @@
           <a:p>
             <a:fld id="{4F39CA0E-E24C-46B9-BDEB-00D69BD4C068}" type="datetimeFigureOut">
               <a:rPr lang="fr-FR" smtClean="0"/>
-              <a:t>26/07/2021</a:t>
+              <a:t>29/07/2021</a:t>
             </a:fld>
             <a:endParaRPr lang="fr-FR"/>
           </a:p>
@@ -2396,7 +2403,7 @@
           <a:p>
             <a:fld id="{4F39CA0E-E24C-46B9-BDEB-00D69BD4C068}" type="datetimeFigureOut">
               <a:rPr lang="fr-FR" smtClean="0"/>
-              <a:t>26/07/2021</a:t>
+              <a:t>29/07/2021</a:t>
             </a:fld>
             <a:endParaRPr lang="fr-FR"/>
           </a:p>
@@ -2684,7 +2691,7 @@
           <a:p>
             <a:fld id="{4F39CA0E-E24C-46B9-BDEB-00D69BD4C068}" type="datetimeFigureOut">
               <a:rPr lang="fr-FR" smtClean="0"/>
-              <a:t>26/07/2021</a:t>
+              <a:t>29/07/2021</a:t>
             </a:fld>
             <a:endParaRPr lang="fr-FR"/>
           </a:p>
@@ -2925,7 +2932,7 @@
           <a:p>
             <a:fld id="{4F39CA0E-E24C-46B9-BDEB-00D69BD4C068}" type="datetimeFigureOut">
               <a:rPr lang="fr-FR" smtClean="0"/>
-              <a:t>26/07/2021</a:t>
+              <a:t>29/07/2021</a:t>
             </a:fld>
             <a:endParaRPr lang="fr-FR"/>
           </a:p>
@@ -4018,7 +4025,7 @@
             <a:lstStyle/>
             <a:p>
               <a:pPr algn="ctr"/>
-              <a:endParaRPr lang="fr-FR">
+              <a:endParaRPr lang="fr-FR" dirty="0">
                 <a:solidFill>
                   <a:schemeClr val="tx1"/>
                 </a:solidFill>
@@ -5532,6 +5539,583 @@
           </p:style>
         </p:cxnSp>
       </p:grpSp>
+      <p:sp>
+        <p:nvSpPr>
+          <p:cNvPr id="5" name="Triangle isocèle 4">
+            <a:extLst>
+              <a:ext uri="{FF2B5EF4-FFF2-40B4-BE49-F238E27FC236}">
+                <a16:creationId xmlns:a16="http://schemas.microsoft.com/office/drawing/2014/main" id="{996AB91B-2695-4C87-ABCF-8959E1E6F97A}"/>
+              </a:ext>
+            </a:extLst>
+          </p:cNvPr>
+          <p:cNvSpPr/>
+          <p:nvPr/>
+        </p:nvSpPr>
+        <p:spPr>
+          <a:xfrm rot="10800000">
+            <a:off x="1368891" y="99318"/>
+            <a:ext cx="1037785" cy="894642"/>
+          </a:xfrm>
+          <a:prstGeom prst="triangle">
+            <a:avLst/>
+          </a:prstGeom>
+          <a:ln>
+            <a:solidFill>
+              <a:schemeClr val="tx1"/>
+            </a:solidFill>
+          </a:ln>
+        </p:spPr>
+        <p:style>
+          <a:lnRef idx="2">
+            <a:schemeClr val="accent1">
+              <a:shade val="50000"/>
+            </a:schemeClr>
+          </a:lnRef>
+          <a:fillRef idx="1">
+            <a:schemeClr val="accent1"/>
+          </a:fillRef>
+          <a:effectRef idx="0">
+            <a:schemeClr val="accent1"/>
+          </a:effectRef>
+          <a:fontRef idx="minor">
+            <a:schemeClr val="lt1"/>
+          </a:fontRef>
+        </p:style>
+        <p:txBody>
+          <a:bodyPr rtlCol="0" anchor="ctr"/>
+          <a:lstStyle/>
+          <a:p>
+            <a:pPr algn="ctr"/>
+            <a:endParaRPr lang="fr-FR"/>
+          </a:p>
+        </p:txBody>
+      </p:sp>
+      <p:grpSp>
+        <p:nvGrpSpPr>
+          <p:cNvPr id="13" name="Groupe 12">
+            <a:extLst>
+              <a:ext uri="{FF2B5EF4-FFF2-40B4-BE49-F238E27FC236}">
+                <a16:creationId xmlns:a16="http://schemas.microsoft.com/office/drawing/2014/main" id="{0A6FEDF8-AD58-413D-8036-AE259781C653}"/>
+              </a:ext>
+            </a:extLst>
+          </p:cNvPr>
+          <p:cNvGrpSpPr/>
+          <p:nvPr/>
+        </p:nvGrpSpPr>
+        <p:grpSpPr>
+          <a:xfrm>
+            <a:off x="993731" y="93679"/>
+            <a:ext cx="1789284" cy="1789284"/>
+            <a:chOff x="993731" y="93679"/>
+            <a:chExt cx="1789284" cy="1789284"/>
+          </a:xfrm>
+        </p:grpSpPr>
+        <p:sp>
+          <p:nvSpPr>
+            <p:cNvPr id="7" name="Arc plein 6">
+              <a:extLst>
+                <a:ext uri="{FF2B5EF4-FFF2-40B4-BE49-F238E27FC236}">
+                  <a16:creationId xmlns:a16="http://schemas.microsoft.com/office/drawing/2014/main" id="{94D0876B-40D8-49DA-B8C5-19B712936B9D}"/>
+                </a:ext>
+              </a:extLst>
+            </p:cNvPr>
+            <p:cNvSpPr/>
+            <p:nvPr/>
+          </p:nvSpPr>
+          <p:spPr>
+            <a:xfrm rot="4500000">
+              <a:off x="993731" y="93679"/>
+              <a:ext cx="1789284" cy="1789284"/>
+            </a:xfrm>
+            <a:prstGeom prst="blockArc">
+              <a:avLst>
+                <a:gd name="adj1" fmla="val 10800000"/>
+                <a:gd name="adj2" fmla="val 12617836"/>
+                <a:gd name="adj3" fmla="val 9901"/>
+              </a:avLst>
+            </a:prstGeom>
+            <a:solidFill>
+              <a:schemeClr val="bg1"/>
+            </a:solidFill>
+            <a:ln>
+              <a:noFill/>
+            </a:ln>
+          </p:spPr>
+          <p:style>
+            <a:lnRef idx="2">
+              <a:schemeClr val="accent1">
+                <a:shade val="50000"/>
+              </a:schemeClr>
+            </a:lnRef>
+            <a:fillRef idx="1">
+              <a:schemeClr val="accent1"/>
+            </a:fillRef>
+            <a:effectRef idx="0">
+              <a:schemeClr val="accent1"/>
+            </a:effectRef>
+            <a:fontRef idx="minor">
+              <a:schemeClr val="lt1"/>
+            </a:fontRef>
+          </p:style>
+          <p:txBody>
+            <a:bodyPr rtlCol="0" anchor="ctr"/>
+            <a:lstStyle/>
+            <a:p>
+              <a:pPr algn="ctr"/>
+              <a:endParaRPr lang="fr-FR">
+                <a:solidFill>
+                  <a:schemeClr val="tx1"/>
+                </a:solidFill>
+              </a:endParaRPr>
+            </a:p>
+          </p:txBody>
+        </p:sp>
+        <p:sp>
+          <p:nvSpPr>
+            <p:cNvPr id="12" name="Rectangle 11">
+              <a:extLst>
+                <a:ext uri="{FF2B5EF4-FFF2-40B4-BE49-F238E27FC236}">
+                  <a16:creationId xmlns:a16="http://schemas.microsoft.com/office/drawing/2014/main" id="{7FD926BD-C732-4818-9F06-28048E1CBF56}"/>
+                </a:ext>
+              </a:extLst>
+            </p:cNvPr>
+            <p:cNvSpPr/>
+            <p:nvPr/>
+          </p:nvSpPr>
+          <p:spPr>
+            <a:xfrm>
+              <a:off x="993731" y="93679"/>
+              <a:ext cx="1789284" cy="1789284"/>
+            </a:xfrm>
+            <a:prstGeom prst="rect">
+              <a:avLst/>
+            </a:prstGeom>
+            <a:noFill/>
+            <a:ln>
+              <a:noFill/>
+            </a:ln>
+          </p:spPr>
+          <p:style>
+            <a:lnRef idx="2">
+              <a:schemeClr val="accent1">
+                <a:shade val="50000"/>
+              </a:schemeClr>
+            </a:lnRef>
+            <a:fillRef idx="1">
+              <a:schemeClr val="accent1"/>
+            </a:fillRef>
+            <a:effectRef idx="0">
+              <a:schemeClr val="accent1"/>
+            </a:effectRef>
+            <a:fontRef idx="minor">
+              <a:schemeClr val="lt1"/>
+            </a:fontRef>
+          </p:style>
+          <p:txBody>
+            <a:bodyPr rtlCol="0" anchor="ctr"/>
+            <a:lstStyle/>
+            <a:p>
+              <a:pPr algn="ctr"/>
+              <a:endParaRPr lang="fr-FR"/>
+            </a:p>
+          </p:txBody>
+        </p:sp>
+      </p:grpSp>
+      <p:grpSp>
+        <p:nvGrpSpPr>
+          <p:cNvPr id="53" name="Groupe 52">
+            <a:extLst>
+              <a:ext uri="{FF2B5EF4-FFF2-40B4-BE49-F238E27FC236}">
+                <a16:creationId xmlns:a16="http://schemas.microsoft.com/office/drawing/2014/main" id="{8B0C30B0-C288-4AA7-ACF9-2D967024754B}"/>
+              </a:ext>
+            </a:extLst>
+          </p:cNvPr>
+          <p:cNvGrpSpPr/>
+          <p:nvPr/>
+        </p:nvGrpSpPr>
+        <p:grpSpPr>
+          <a:xfrm>
+            <a:off x="9866533" y="182095"/>
+            <a:ext cx="1743891" cy="1743891"/>
+            <a:chOff x="4023360" y="2349335"/>
+            <a:chExt cx="1743891" cy="1743891"/>
+          </a:xfrm>
+        </p:grpSpPr>
+        <p:sp>
+          <p:nvSpPr>
+            <p:cNvPr id="57" name="Rectangle 56">
+              <a:extLst>
+                <a:ext uri="{FF2B5EF4-FFF2-40B4-BE49-F238E27FC236}">
+                  <a16:creationId xmlns:a16="http://schemas.microsoft.com/office/drawing/2014/main" id="{316CD1A3-D7B6-4C32-B087-D95F09262BA3}"/>
+                </a:ext>
+              </a:extLst>
+            </p:cNvPr>
+            <p:cNvSpPr/>
+            <p:nvPr/>
+          </p:nvSpPr>
+          <p:spPr>
+            <a:xfrm>
+              <a:off x="4023360" y="2349335"/>
+              <a:ext cx="1743891" cy="1743891"/>
+            </a:xfrm>
+            <a:prstGeom prst="rect">
+              <a:avLst/>
+            </a:prstGeom>
+            <a:noFill/>
+            <a:ln>
+              <a:noFill/>
+            </a:ln>
+          </p:spPr>
+          <p:style>
+            <a:lnRef idx="2">
+              <a:schemeClr val="accent1">
+                <a:shade val="50000"/>
+              </a:schemeClr>
+            </a:lnRef>
+            <a:fillRef idx="1">
+              <a:schemeClr val="accent1"/>
+            </a:fillRef>
+            <a:effectRef idx="0">
+              <a:schemeClr val="accent1"/>
+            </a:effectRef>
+            <a:fontRef idx="minor">
+              <a:schemeClr val="lt1"/>
+            </a:fontRef>
+          </p:style>
+          <p:txBody>
+            <a:bodyPr rtlCol="0" anchor="ctr"/>
+            <a:lstStyle/>
+            <a:p>
+              <a:pPr algn="ctr"/>
+              <a:endParaRPr lang="fr-FR"/>
+            </a:p>
+          </p:txBody>
+        </p:sp>
+        <p:sp>
+          <p:nvSpPr>
+            <p:cNvPr id="59" name="Ellipse 58">
+              <a:extLst>
+                <a:ext uri="{FF2B5EF4-FFF2-40B4-BE49-F238E27FC236}">
+                  <a16:creationId xmlns:a16="http://schemas.microsoft.com/office/drawing/2014/main" id="{0F7F20AA-1A44-43A4-A336-6358B8CA97FD}"/>
+                </a:ext>
+              </a:extLst>
+            </p:cNvPr>
+            <p:cNvSpPr/>
+            <p:nvPr/>
+          </p:nvSpPr>
+          <p:spPr>
+            <a:xfrm>
+              <a:off x="4057105" y="2383080"/>
+              <a:ext cx="1676400" cy="1676400"/>
+            </a:xfrm>
+            <a:prstGeom prst="ellipse">
+              <a:avLst/>
+            </a:prstGeom>
+            <a:solidFill>
+              <a:schemeClr val="bg1"/>
+            </a:solidFill>
+            <a:ln w="76200">
+              <a:solidFill>
+                <a:schemeClr val="tx1"/>
+              </a:solidFill>
+            </a:ln>
+          </p:spPr>
+          <p:style>
+            <a:lnRef idx="2">
+              <a:schemeClr val="accent1">
+                <a:shade val="50000"/>
+              </a:schemeClr>
+            </a:lnRef>
+            <a:fillRef idx="1">
+              <a:schemeClr val="accent1"/>
+            </a:fillRef>
+            <a:effectRef idx="0">
+              <a:schemeClr val="accent1"/>
+            </a:effectRef>
+            <a:fontRef idx="minor">
+              <a:schemeClr val="lt1"/>
+            </a:fontRef>
+          </p:style>
+          <p:txBody>
+            <a:bodyPr rtlCol="0" anchor="ctr"/>
+            <a:lstStyle/>
+            <a:p>
+              <a:pPr algn="ctr"/>
+              <a:endParaRPr lang="fr-FR"/>
+            </a:p>
+          </p:txBody>
+        </p:sp>
+      </p:grpSp>
+      <p:grpSp>
+        <p:nvGrpSpPr>
+          <p:cNvPr id="60" name="Groupe 59">
+            <a:extLst>
+              <a:ext uri="{FF2B5EF4-FFF2-40B4-BE49-F238E27FC236}">
+                <a16:creationId xmlns:a16="http://schemas.microsoft.com/office/drawing/2014/main" id="{B59BBCDF-3ECF-48B4-ACCB-89E8B7102021}"/>
+              </a:ext>
+            </a:extLst>
+          </p:cNvPr>
+          <p:cNvGrpSpPr/>
+          <p:nvPr/>
+        </p:nvGrpSpPr>
+        <p:grpSpPr>
+          <a:xfrm>
+            <a:off x="2099239" y="170013"/>
+            <a:ext cx="1743891" cy="1743891"/>
+            <a:chOff x="4023360" y="2349335"/>
+            <a:chExt cx="1743891" cy="1743891"/>
+          </a:xfrm>
+        </p:grpSpPr>
+        <p:sp>
+          <p:nvSpPr>
+            <p:cNvPr id="61" name="Rectangle 60">
+              <a:extLst>
+                <a:ext uri="{FF2B5EF4-FFF2-40B4-BE49-F238E27FC236}">
+                  <a16:creationId xmlns:a16="http://schemas.microsoft.com/office/drawing/2014/main" id="{0D71A87A-F4C6-49A7-80B3-032BBB9C87CE}"/>
+                </a:ext>
+              </a:extLst>
+            </p:cNvPr>
+            <p:cNvSpPr/>
+            <p:nvPr/>
+          </p:nvSpPr>
+          <p:spPr>
+            <a:xfrm>
+              <a:off x="4023360" y="2349335"/>
+              <a:ext cx="1743891" cy="1743891"/>
+            </a:xfrm>
+            <a:prstGeom prst="rect">
+              <a:avLst/>
+            </a:prstGeom>
+            <a:solidFill>
+              <a:schemeClr val="tx1"/>
+            </a:solidFill>
+            <a:ln>
+              <a:noFill/>
+            </a:ln>
+          </p:spPr>
+          <p:style>
+            <a:lnRef idx="2">
+              <a:schemeClr val="accent1">
+                <a:shade val="50000"/>
+              </a:schemeClr>
+            </a:lnRef>
+            <a:fillRef idx="1">
+              <a:schemeClr val="accent1"/>
+            </a:fillRef>
+            <a:effectRef idx="0">
+              <a:schemeClr val="accent1"/>
+            </a:effectRef>
+            <a:fontRef idx="minor">
+              <a:schemeClr val="lt1"/>
+            </a:fontRef>
+          </p:style>
+          <p:txBody>
+            <a:bodyPr rtlCol="0" anchor="ctr"/>
+            <a:lstStyle/>
+            <a:p>
+              <a:pPr algn="ctr"/>
+              <a:endParaRPr lang="fr-FR"/>
+            </a:p>
+          </p:txBody>
+        </p:sp>
+        <p:sp>
+          <p:nvSpPr>
+            <p:cNvPr id="62" name="Ellipse 61">
+              <a:extLst>
+                <a:ext uri="{FF2B5EF4-FFF2-40B4-BE49-F238E27FC236}">
+                  <a16:creationId xmlns:a16="http://schemas.microsoft.com/office/drawing/2014/main" id="{F920EE9C-9939-4CB1-A3C5-EB1C94DF415E}"/>
+                </a:ext>
+              </a:extLst>
+            </p:cNvPr>
+            <p:cNvSpPr/>
+            <p:nvPr/>
+          </p:nvSpPr>
+          <p:spPr>
+            <a:xfrm>
+              <a:off x="4057105" y="2383080"/>
+              <a:ext cx="1676400" cy="1676400"/>
+            </a:xfrm>
+            <a:prstGeom prst="ellipse">
+              <a:avLst/>
+            </a:prstGeom>
+            <a:gradFill flip="none" rotWithShape="1">
+              <a:gsLst>
+                <a:gs pos="0">
+                  <a:schemeClr val="tx1"/>
+                </a:gs>
+                <a:gs pos="100000">
+                  <a:schemeClr val="bg1"/>
+                </a:gs>
+              </a:gsLst>
+              <a:path path="circle">
+                <a:fillToRect l="50000" t="50000" r="50000" b="50000"/>
+              </a:path>
+              <a:tileRect/>
+            </a:gradFill>
+            <a:ln>
+              <a:noFill/>
+            </a:ln>
+          </p:spPr>
+          <p:style>
+            <a:lnRef idx="2">
+              <a:schemeClr val="accent1">
+                <a:shade val="50000"/>
+              </a:schemeClr>
+            </a:lnRef>
+            <a:fillRef idx="1">
+              <a:schemeClr val="accent1"/>
+            </a:fillRef>
+            <a:effectRef idx="0">
+              <a:schemeClr val="accent1"/>
+            </a:effectRef>
+            <a:fontRef idx="minor">
+              <a:schemeClr val="lt1"/>
+            </a:fontRef>
+          </p:style>
+          <p:txBody>
+            <a:bodyPr rtlCol="0" anchor="ctr"/>
+            <a:lstStyle/>
+            <a:p>
+              <a:pPr algn="ctr"/>
+              <a:endParaRPr lang="fr-FR"/>
+            </a:p>
+          </p:txBody>
+        </p:sp>
+      </p:grpSp>
+      <p:grpSp>
+        <p:nvGrpSpPr>
+          <p:cNvPr id="73" name="Groupe 72">
+            <a:extLst>
+              <a:ext uri="{FF2B5EF4-FFF2-40B4-BE49-F238E27FC236}">
+                <a16:creationId xmlns:a16="http://schemas.microsoft.com/office/drawing/2014/main" id="{82844EA5-F8F7-487D-8FE5-31D4839B8CCB}"/>
+              </a:ext>
+            </a:extLst>
+          </p:cNvPr>
+          <p:cNvGrpSpPr/>
+          <p:nvPr/>
+        </p:nvGrpSpPr>
+        <p:grpSpPr>
+          <a:xfrm>
+            <a:off x="3851727" y="-61852"/>
+            <a:ext cx="1743891" cy="1743891"/>
+            <a:chOff x="4023360" y="2349335"/>
+            <a:chExt cx="1743891" cy="1743891"/>
+          </a:xfrm>
+        </p:grpSpPr>
+        <p:sp>
+          <p:nvSpPr>
+            <p:cNvPr id="75" name="Rectangle 74">
+              <a:extLst>
+                <a:ext uri="{FF2B5EF4-FFF2-40B4-BE49-F238E27FC236}">
+                  <a16:creationId xmlns:a16="http://schemas.microsoft.com/office/drawing/2014/main" id="{99D1A65D-32E4-4534-98EC-9C98758CBC1E}"/>
+                </a:ext>
+              </a:extLst>
+            </p:cNvPr>
+            <p:cNvSpPr/>
+            <p:nvPr/>
+          </p:nvSpPr>
+          <p:spPr>
+            <a:xfrm>
+              <a:off x="4023360" y="2349335"/>
+              <a:ext cx="1743891" cy="1743891"/>
+            </a:xfrm>
+            <a:prstGeom prst="rect">
+              <a:avLst/>
+            </a:prstGeom>
+            <a:noFill/>
+            <a:ln>
+              <a:noFill/>
+            </a:ln>
+          </p:spPr>
+          <p:style>
+            <a:lnRef idx="2">
+              <a:schemeClr val="accent1">
+                <a:shade val="50000"/>
+              </a:schemeClr>
+            </a:lnRef>
+            <a:fillRef idx="1">
+              <a:schemeClr val="accent1"/>
+            </a:fillRef>
+            <a:effectRef idx="0">
+              <a:schemeClr val="accent1"/>
+            </a:effectRef>
+            <a:fontRef idx="minor">
+              <a:schemeClr val="lt1"/>
+            </a:fontRef>
+          </p:style>
+          <p:txBody>
+            <a:bodyPr rtlCol="0" anchor="ctr"/>
+            <a:lstStyle/>
+            <a:p>
+              <a:pPr algn="ctr"/>
+              <a:endParaRPr lang="fr-FR"/>
+            </a:p>
+          </p:txBody>
+        </p:sp>
+        <p:sp>
+          <p:nvSpPr>
+            <p:cNvPr id="76" name="Ellipse 75">
+              <a:extLst>
+                <a:ext uri="{FF2B5EF4-FFF2-40B4-BE49-F238E27FC236}">
+                  <a16:creationId xmlns:a16="http://schemas.microsoft.com/office/drawing/2014/main" id="{F8388F4B-E06A-4626-8760-53E82ED7609C}"/>
+                </a:ext>
+              </a:extLst>
+            </p:cNvPr>
+            <p:cNvSpPr/>
+            <p:nvPr/>
+          </p:nvSpPr>
+          <p:spPr>
+            <a:xfrm>
+              <a:off x="4057105" y="2383080"/>
+              <a:ext cx="1676400" cy="1676400"/>
+            </a:xfrm>
+            <a:prstGeom prst="ellipse">
+              <a:avLst/>
+            </a:prstGeom>
+            <a:gradFill flip="none" rotWithShape="1">
+              <a:gsLst>
+                <a:gs pos="0">
+                  <a:schemeClr val="tx1"/>
+                </a:gs>
+                <a:gs pos="100000">
+                  <a:schemeClr val="bg1"/>
+                </a:gs>
+              </a:gsLst>
+              <a:path path="circle">
+                <a:fillToRect l="50000" t="50000" r="50000" b="50000"/>
+              </a:path>
+              <a:tileRect/>
+            </a:gradFill>
+            <a:ln>
+              <a:noFill/>
+            </a:ln>
+          </p:spPr>
+          <p:style>
+            <a:lnRef idx="2">
+              <a:schemeClr val="accent1">
+                <a:shade val="50000"/>
+              </a:schemeClr>
+            </a:lnRef>
+            <a:fillRef idx="1">
+              <a:schemeClr val="accent1"/>
+            </a:fillRef>
+            <a:effectRef idx="0">
+              <a:schemeClr val="accent1"/>
+            </a:effectRef>
+            <a:fontRef idx="minor">
+              <a:schemeClr val="lt1"/>
+            </a:fontRef>
+          </p:style>
+          <p:txBody>
+            <a:bodyPr rtlCol="0" anchor="ctr"/>
+            <a:lstStyle/>
+            <a:p>
+              <a:pPr algn="ctr"/>
+              <a:endParaRPr lang="fr-FR"/>
+            </a:p>
+          </p:txBody>
+        </p:sp>
+      </p:grpSp>
     </p:spTree>
     <p:extLst>
       <p:ext uri="{BB962C8B-B14F-4D97-AF65-F5344CB8AC3E}">

</xml_diff>

<commit_message>
Adding icon projection support for safety agent
</commit_message>
<xml_diff>
--- a/Texture.pptx
+++ b/Texture.pptx
@@ -225,7 +225,7 @@
           <a:p>
             <a:fld id="{9C6E8CA1-8768-4FFA-A312-B81E8CE2B072}" type="datetimeFigureOut">
               <a:rPr lang="fr-FR" smtClean="0"/>
-              <a:t>25/08/2021</a:t>
+              <a:t>02/09/2021</a:t>
             </a:fld>
             <a:endParaRPr lang="fr-FR"/>
           </a:p>
@@ -1143,7 +1143,7 @@
           <a:p>
             <a:fld id="{4F39CA0E-E24C-46B9-BDEB-00D69BD4C068}" type="datetimeFigureOut">
               <a:rPr lang="fr-FR" smtClean="0"/>
-              <a:t>25/08/2021</a:t>
+              <a:t>02/09/2021</a:t>
             </a:fld>
             <a:endParaRPr lang="fr-FR"/>
           </a:p>
@@ -1341,7 +1341,7 @@
           <a:p>
             <a:fld id="{4F39CA0E-E24C-46B9-BDEB-00D69BD4C068}" type="datetimeFigureOut">
               <a:rPr lang="fr-FR" smtClean="0"/>
-              <a:t>25/08/2021</a:t>
+              <a:t>02/09/2021</a:t>
             </a:fld>
             <a:endParaRPr lang="fr-FR"/>
           </a:p>
@@ -1549,7 +1549,7 @@
           <a:p>
             <a:fld id="{4F39CA0E-E24C-46B9-BDEB-00D69BD4C068}" type="datetimeFigureOut">
               <a:rPr lang="fr-FR" smtClean="0"/>
-              <a:t>25/08/2021</a:t>
+              <a:t>02/09/2021</a:t>
             </a:fld>
             <a:endParaRPr lang="fr-FR"/>
           </a:p>
@@ -1747,7 +1747,7 @@
           <a:p>
             <a:fld id="{4F39CA0E-E24C-46B9-BDEB-00D69BD4C068}" type="datetimeFigureOut">
               <a:rPr lang="fr-FR" smtClean="0"/>
-              <a:t>25/08/2021</a:t>
+              <a:t>02/09/2021</a:t>
             </a:fld>
             <a:endParaRPr lang="fr-FR"/>
           </a:p>
@@ -2022,7 +2022,7 @@
           <a:p>
             <a:fld id="{4F39CA0E-E24C-46B9-BDEB-00D69BD4C068}" type="datetimeFigureOut">
               <a:rPr lang="fr-FR" smtClean="0"/>
-              <a:t>25/08/2021</a:t>
+              <a:t>02/09/2021</a:t>
             </a:fld>
             <a:endParaRPr lang="fr-FR"/>
           </a:p>
@@ -2287,7 +2287,7 @@
           <a:p>
             <a:fld id="{4F39CA0E-E24C-46B9-BDEB-00D69BD4C068}" type="datetimeFigureOut">
               <a:rPr lang="fr-FR" smtClean="0"/>
-              <a:t>25/08/2021</a:t>
+              <a:t>02/09/2021</a:t>
             </a:fld>
             <a:endParaRPr lang="fr-FR"/>
           </a:p>
@@ -2699,7 +2699,7 @@
           <a:p>
             <a:fld id="{4F39CA0E-E24C-46B9-BDEB-00D69BD4C068}" type="datetimeFigureOut">
               <a:rPr lang="fr-FR" smtClean="0"/>
-              <a:t>25/08/2021</a:t>
+              <a:t>02/09/2021</a:t>
             </a:fld>
             <a:endParaRPr lang="fr-FR"/>
           </a:p>
@@ -2840,7 +2840,7 @@
           <a:p>
             <a:fld id="{4F39CA0E-E24C-46B9-BDEB-00D69BD4C068}" type="datetimeFigureOut">
               <a:rPr lang="fr-FR" smtClean="0"/>
-              <a:t>25/08/2021</a:t>
+              <a:t>02/09/2021</a:t>
             </a:fld>
             <a:endParaRPr lang="fr-FR"/>
           </a:p>
@@ -2953,7 +2953,7 @@
           <a:p>
             <a:fld id="{4F39CA0E-E24C-46B9-BDEB-00D69BD4C068}" type="datetimeFigureOut">
               <a:rPr lang="fr-FR" smtClean="0"/>
-              <a:t>25/08/2021</a:t>
+              <a:t>02/09/2021</a:t>
             </a:fld>
             <a:endParaRPr lang="fr-FR"/>
           </a:p>
@@ -3264,7 +3264,7 @@
           <a:p>
             <a:fld id="{4F39CA0E-E24C-46B9-BDEB-00D69BD4C068}" type="datetimeFigureOut">
               <a:rPr lang="fr-FR" smtClean="0"/>
-              <a:t>25/08/2021</a:t>
+              <a:t>02/09/2021</a:t>
             </a:fld>
             <a:endParaRPr lang="fr-FR"/>
           </a:p>
@@ -3552,7 +3552,7 @@
           <a:p>
             <a:fld id="{4F39CA0E-E24C-46B9-BDEB-00D69BD4C068}" type="datetimeFigureOut">
               <a:rPr lang="fr-FR" smtClean="0"/>
-              <a:t>25/08/2021</a:t>
+              <a:t>02/09/2021</a:t>
             </a:fld>
             <a:endParaRPr lang="fr-FR"/>
           </a:p>
@@ -3793,7 +3793,7 @@
           <a:p>
             <a:fld id="{4F39CA0E-E24C-46B9-BDEB-00D69BD4C068}" type="datetimeFigureOut">
               <a:rPr lang="fr-FR" smtClean="0"/>
-              <a:t>25/08/2021</a:t>
+              <a:t>02/09/2021</a:t>
             </a:fld>
             <a:endParaRPr lang="fr-FR"/>
           </a:p>
@@ -8106,6 +8106,60 @@
           <a:p>
             <a:pPr algn="ctr"/>
             <a:endParaRPr lang="fr-FR" dirty="0"/>
+          </a:p>
+        </p:txBody>
+      </p:sp>
+      <p:sp>
+        <p:nvSpPr>
+          <p:cNvPr id="3" name="Rectangle 2">
+            <a:extLst>
+              <a:ext uri="{FF2B5EF4-FFF2-40B4-BE49-F238E27FC236}">
+                <a16:creationId xmlns:a16="http://schemas.microsoft.com/office/drawing/2014/main" id="{5F0FC482-A374-4787-B82C-12B4F9F7754D}"/>
+              </a:ext>
+            </a:extLst>
+          </p:cNvPr>
+          <p:cNvSpPr/>
+          <p:nvPr/>
+        </p:nvSpPr>
+        <p:spPr>
+          <a:xfrm>
+            <a:off x="2634470" y="1679524"/>
+            <a:ext cx="3600000" cy="3600000"/>
+          </a:xfrm>
+          <a:prstGeom prst="rect">
+            <a:avLst/>
+          </a:prstGeom>
+          <a:solidFill>
+            <a:schemeClr val="bg1"/>
+          </a:solidFill>
+          <a:ln>
+            <a:solidFill>
+              <a:schemeClr val="bg1"/>
+            </a:solidFill>
+          </a:ln>
+        </p:spPr>
+        <p:style>
+          <a:lnRef idx="2">
+            <a:schemeClr val="accent1">
+              <a:shade val="50000"/>
+            </a:schemeClr>
+          </a:lnRef>
+          <a:fillRef idx="1">
+            <a:schemeClr val="accent1"/>
+          </a:fillRef>
+          <a:effectRef idx="0">
+            <a:schemeClr val="accent1"/>
+          </a:effectRef>
+          <a:fontRef idx="minor">
+            <a:schemeClr val="lt1"/>
+          </a:fontRef>
+        </p:style>
+        <p:txBody>
+          <a:bodyPr rtlCol="0" anchor="ctr"/>
+          <a:lstStyle/>
+          <a:p>
+            <a:pPr algn="ctr"/>
+            <a:endParaRPr lang="fr-FR"/>
           </a:p>
         </p:txBody>
       </p:sp>

</xml_diff>

<commit_message>
Improving source code of safety guardian
</commit_message>
<xml_diff>
--- a/Texture.pptx
+++ b/Texture.pptx
@@ -10475,239 +10475,6 @@
           </p:sp>
         </p:grpSp>
       </p:grpSp>
-      <p:grpSp>
-        <p:nvGrpSpPr>
-          <p:cNvPr id="257" name="Groupe 256">
-            <a:extLst>
-              <a:ext uri="{FF2B5EF4-FFF2-40B4-BE49-F238E27FC236}">
-                <a16:creationId xmlns:a16="http://schemas.microsoft.com/office/drawing/2014/main" id="{504D6FA4-5A9A-4334-A04E-7E53DAC2521B}"/>
-              </a:ext>
-            </a:extLst>
-          </p:cNvPr>
-          <p:cNvGrpSpPr/>
-          <p:nvPr/>
-        </p:nvGrpSpPr>
-        <p:grpSpPr>
-          <a:xfrm>
-            <a:off x="7774953" y="4828603"/>
-            <a:ext cx="322031" cy="630000"/>
-            <a:chOff x="1548202" y="3796373"/>
-            <a:chExt cx="322031" cy="630000"/>
-          </a:xfrm>
-        </p:grpSpPr>
-        <p:sp>
-          <p:nvSpPr>
-            <p:cNvPr id="258" name="Cylindre 257">
-              <a:extLst>
-                <a:ext uri="{FF2B5EF4-FFF2-40B4-BE49-F238E27FC236}">
-                  <a16:creationId xmlns:a16="http://schemas.microsoft.com/office/drawing/2014/main" id="{55CC5CE7-AF1E-40FF-99E9-29062AF7BFD7}"/>
-                </a:ext>
-              </a:extLst>
-            </p:cNvPr>
-            <p:cNvSpPr/>
-            <p:nvPr/>
-          </p:nvSpPr>
-          <p:spPr>
-            <a:xfrm>
-              <a:off x="1548202" y="3796373"/>
-              <a:ext cx="322031" cy="630000"/>
-            </a:xfrm>
-            <a:prstGeom prst="can">
-              <a:avLst/>
-            </a:prstGeom>
-            <a:solidFill>
-              <a:schemeClr val="bg1"/>
-            </a:solidFill>
-            <a:ln w="19050">
-              <a:solidFill>
-                <a:schemeClr val="tx1"/>
-              </a:solidFill>
-            </a:ln>
-          </p:spPr>
-          <p:style>
-            <a:lnRef idx="2">
-              <a:schemeClr val="accent1">
-                <a:shade val="50000"/>
-              </a:schemeClr>
-            </a:lnRef>
-            <a:fillRef idx="1">
-              <a:schemeClr val="accent1"/>
-            </a:fillRef>
-            <a:effectRef idx="0">
-              <a:schemeClr val="accent1"/>
-            </a:effectRef>
-            <a:fontRef idx="minor">
-              <a:schemeClr val="lt1"/>
-            </a:fontRef>
-          </p:style>
-          <p:txBody>
-            <a:bodyPr rtlCol="0" anchor="ctr"/>
-            <a:lstStyle/>
-            <a:p>
-              <a:pPr algn="ctr"/>
-              <a:endParaRPr lang="fr-FR"/>
-            </a:p>
-          </p:txBody>
-        </p:sp>
-        <p:sp>
-          <p:nvSpPr>
-            <p:cNvPr id="259" name="Cylindre 258">
-              <a:extLst>
-                <a:ext uri="{FF2B5EF4-FFF2-40B4-BE49-F238E27FC236}">
-                  <a16:creationId xmlns:a16="http://schemas.microsoft.com/office/drawing/2014/main" id="{369B9A6F-B4B8-4171-8878-261EA04A90BB}"/>
-                </a:ext>
-              </a:extLst>
-            </p:cNvPr>
-            <p:cNvSpPr/>
-            <p:nvPr/>
-          </p:nvSpPr>
-          <p:spPr>
-            <a:xfrm>
-              <a:off x="1548202" y="4258099"/>
-              <a:ext cx="322031" cy="168274"/>
-            </a:xfrm>
-            <a:prstGeom prst="can">
-              <a:avLst>
-                <a:gd name="adj" fmla="val 50000"/>
-              </a:avLst>
-            </a:prstGeom>
-            <a:solidFill>
-              <a:srgbClr val="DCE5F4"/>
-            </a:solidFill>
-            <a:ln w="19050">
-              <a:solidFill>
-                <a:schemeClr val="tx1"/>
-              </a:solidFill>
-            </a:ln>
-          </p:spPr>
-          <p:style>
-            <a:lnRef idx="2">
-              <a:schemeClr val="accent1">
-                <a:shade val="50000"/>
-              </a:schemeClr>
-            </a:lnRef>
-            <a:fillRef idx="1">
-              <a:schemeClr val="accent1"/>
-            </a:fillRef>
-            <a:effectRef idx="0">
-              <a:schemeClr val="accent1"/>
-            </a:effectRef>
-            <a:fontRef idx="minor">
-              <a:schemeClr val="lt1"/>
-            </a:fontRef>
-          </p:style>
-          <p:txBody>
-            <a:bodyPr rtlCol="0" anchor="ctr"/>
-            <a:lstStyle/>
-            <a:p>
-              <a:pPr algn="ctr"/>
-              <a:endParaRPr lang="fr-FR"/>
-            </a:p>
-          </p:txBody>
-        </p:sp>
-        <p:sp>
-          <p:nvSpPr>
-            <p:cNvPr id="260" name="Flèche : droite 259">
-              <a:extLst>
-                <a:ext uri="{FF2B5EF4-FFF2-40B4-BE49-F238E27FC236}">
-                  <a16:creationId xmlns:a16="http://schemas.microsoft.com/office/drawing/2014/main" id="{9F65CD97-B287-4629-92D6-E3B5152DB110}"/>
-                </a:ext>
-              </a:extLst>
-            </p:cNvPr>
-            <p:cNvSpPr/>
-            <p:nvPr/>
-          </p:nvSpPr>
-          <p:spPr>
-            <a:xfrm rot="16200000">
-              <a:off x="1460890" y="4010046"/>
-              <a:ext cx="496651" cy="113762"/>
-            </a:xfrm>
-            <a:prstGeom prst="rightArrow">
-              <a:avLst>
-                <a:gd name="adj1" fmla="val 50000"/>
-                <a:gd name="adj2" fmla="val 58725"/>
-              </a:avLst>
-            </a:prstGeom>
-            <a:solidFill>
-              <a:schemeClr val="tx1"/>
-            </a:solidFill>
-            <a:ln>
-              <a:solidFill>
-                <a:schemeClr val="bg1"/>
-              </a:solidFill>
-            </a:ln>
-          </p:spPr>
-          <p:style>
-            <a:lnRef idx="2">
-              <a:schemeClr val="accent1">
-                <a:shade val="50000"/>
-              </a:schemeClr>
-            </a:lnRef>
-            <a:fillRef idx="1">
-              <a:schemeClr val="accent1"/>
-            </a:fillRef>
-            <a:effectRef idx="0">
-              <a:schemeClr val="accent1"/>
-            </a:effectRef>
-            <a:fontRef idx="minor">
-              <a:schemeClr val="lt1"/>
-            </a:fontRef>
-          </p:style>
-          <p:txBody>
-            <a:bodyPr rtlCol="0" anchor="ctr"/>
-            <a:lstStyle/>
-            <a:p>
-              <a:pPr algn="ctr"/>
-              <a:endParaRPr lang="fr-FR"/>
-            </a:p>
-          </p:txBody>
-        </p:sp>
-      </p:grpSp>
-      <p:sp>
-        <p:nvSpPr>
-          <p:cNvPr id="261" name="ZoneTexte 260">
-            <a:extLst>
-              <a:ext uri="{FF2B5EF4-FFF2-40B4-BE49-F238E27FC236}">
-                <a16:creationId xmlns:a16="http://schemas.microsoft.com/office/drawing/2014/main" id="{C4F72258-6673-4A75-9BF1-D14239CB30A1}"/>
-              </a:ext>
-            </a:extLst>
-          </p:cNvPr>
-          <p:cNvSpPr txBox="1"/>
-          <p:nvPr/>
-        </p:nvSpPr>
-        <p:spPr>
-          <a:xfrm>
-            <a:off x="7517899" y="5491180"/>
-            <a:ext cx="836134" cy="338554"/>
-          </a:xfrm>
-          <a:prstGeom prst="rect">
-            <a:avLst/>
-          </a:prstGeom>
-          <a:noFill/>
-        </p:spPr>
-        <p:txBody>
-          <a:bodyPr wrap="square" rtlCol="0">
-            <a:spAutoFit/>
-          </a:bodyPr>
-          <a:lstStyle/>
-          <a:p>
-            <a:pPr algn="ctr"/>
-            <a:r>
-              <a:rPr lang="fr-FR" sz="1600" b="1" dirty="0">
-                <a:ln>
-                  <a:solidFill>
-                    <a:schemeClr val="tx1"/>
-                  </a:solidFill>
-                </a:ln>
-                <a:solidFill>
-                  <a:schemeClr val="bg1"/>
-                </a:solidFill>
-              </a:rPr>
-              <a:t>+ 3 cm</a:t>
-            </a:r>
-          </a:p>
-        </p:txBody>
-      </p:sp>
       <p:sp>
         <p:nvSpPr>
           <p:cNvPr id="262" name="ZoneTexte 261">
@@ -10753,6 +10520,1363 @@
           </a:p>
         </p:txBody>
       </p:sp>
+      <p:grpSp>
+        <p:nvGrpSpPr>
+          <p:cNvPr id="3" name="Groupe 2">
+            <a:extLst>
+              <a:ext uri="{FF2B5EF4-FFF2-40B4-BE49-F238E27FC236}">
+                <a16:creationId xmlns:a16="http://schemas.microsoft.com/office/drawing/2014/main" id="{A0F20150-1AB7-42DA-8F0A-97A0E7DBAB0D}"/>
+              </a:ext>
+            </a:extLst>
+          </p:cNvPr>
+          <p:cNvGrpSpPr/>
+          <p:nvPr/>
+        </p:nvGrpSpPr>
+        <p:grpSpPr>
+          <a:xfrm>
+            <a:off x="6728656" y="4482007"/>
+            <a:ext cx="1340630" cy="1340630"/>
+            <a:chOff x="7233380" y="4605192"/>
+            <a:chExt cx="1340630" cy="1340630"/>
+          </a:xfrm>
+        </p:grpSpPr>
+        <p:grpSp>
+          <p:nvGrpSpPr>
+            <p:cNvPr id="2" name="Groupe 1">
+              <a:extLst>
+                <a:ext uri="{FF2B5EF4-FFF2-40B4-BE49-F238E27FC236}">
+                  <a16:creationId xmlns:a16="http://schemas.microsoft.com/office/drawing/2014/main" id="{2DB00417-6203-4732-9210-226EC159734A}"/>
+                </a:ext>
+              </a:extLst>
+            </p:cNvPr>
+            <p:cNvGrpSpPr/>
+            <p:nvPr/>
+          </p:nvGrpSpPr>
+          <p:grpSpPr>
+            <a:xfrm>
+              <a:off x="7485628" y="4774942"/>
+              <a:ext cx="836134" cy="1001131"/>
+              <a:chOff x="7517899" y="4828603"/>
+              <a:chExt cx="836134" cy="1001131"/>
+            </a:xfrm>
+          </p:grpSpPr>
+          <p:grpSp>
+            <p:nvGrpSpPr>
+              <p:cNvPr id="257" name="Groupe 256">
+                <a:extLst>
+                  <a:ext uri="{FF2B5EF4-FFF2-40B4-BE49-F238E27FC236}">
+                    <a16:creationId xmlns:a16="http://schemas.microsoft.com/office/drawing/2014/main" id="{504D6FA4-5A9A-4334-A04E-7E53DAC2521B}"/>
+                  </a:ext>
+                </a:extLst>
+              </p:cNvPr>
+              <p:cNvGrpSpPr/>
+              <p:nvPr/>
+            </p:nvGrpSpPr>
+            <p:grpSpPr>
+              <a:xfrm>
+                <a:off x="7774953" y="4828603"/>
+                <a:ext cx="322031" cy="630000"/>
+                <a:chOff x="1548202" y="3796373"/>
+                <a:chExt cx="322031" cy="630000"/>
+              </a:xfrm>
+            </p:grpSpPr>
+            <p:sp>
+              <p:nvSpPr>
+                <p:cNvPr id="258" name="Cylindre 257">
+                  <a:extLst>
+                    <a:ext uri="{FF2B5EF4-FFF2-40B4-BE49-F238E27FC236}">
+                      <a16:creationId xmlns:a16="http://schemas.microsoft.com/office/drawing/2014/main" id="{55CC5CE7-AF1E-40FF-99E9-29062AF7BFD7}"/>
+                    </a:ext>
+                  </a:extLst>
+                </p:cNvPr>
+                <p:cNvSpPr/>
+                <p:nvPr/>
+              </p:nvSpPr>
+              <p:spPr>
+                <a:xfrm>
+                  <a:off x="1548202" y="3796373"/>
+                  <a:ext cx="322031" cy="630000"/>
+                </a:xfrm>
+                <a:prstGeom prst="can">
+                  <a:avLst/>
+                </a:prstGeom>
+                <a:solidFill>
+                  <a:schemeClr val="bg1"/>
+                </a:solidFill>
+                <a:ln w="19050">
+                  <a:solidFill>
+                    <a:schemeClr val="tx1"/>
+                  </a:solidFill>
+                </a:ln>
+              </p:spPr>
+              <p:style>
+                <a:lnRef idx="2">
+                  <a:schemeClr val="accent1">
+                    <a:shade val="50000"/>
+                  </a:schemeClr>
+                </a:lnRef>
+                <a:fillRef idx="1">
+                  <a:schemeClr val="accent1"/>
+                </a:fillRef>
+                <a:effectRef idx="0">
+                  <a:schemeClr val="accent1"/>
+                </a:effectRef>
+                <a:fontRef idx="minor">
+                  <a:schemeClr val="lt1"/>
+                </a:fontRef>
+              </p:style>
+              <p:txBody>
+                <a:bodyPr rtlCol="0" anchor="ctr"/>
+                <a:lstStyle/>
+                <a:p>
+                  <a:pPr algn="ctr"/>
+                  <a:endParaRPr lang="fr-FR"/>
+                </a:p>
+              </p:txBody>
+            </p:sp>
+            <p:sp>
+              <p:nvSpPr>
+                <p:cNvPr id="259" name="Cylindre 258">
+                  <a:extLst>
+                    <a:ext uri="{FF2B5EF4-FFF2-40B4-BE49-F238E27FC236}">
+                      <a16:creationId xmlns:a16="http://schemas.microsoft.com/office/drawing/2014/main" id="{369B9A6F-B4B8-4171-8878-261EA04A90BB}"/>
+                    </a:ext>
+                  </a:extLst>
+                </p:cNvPr>
+                <p:cNvSpPr/>
+                <p:nvPr/>
+              </p:nvSpPr>
+              <p:spPr>
+                <a:xfrm>
+                  <a:off x="1548202" y="4258099"/>
+                  <a:ext cx="322031" cy="168274"/>
+                </a:xfrm>
+                <a:prstGeom prst="can">
+                  <a:avLst>
+                    <a:gd name="adj" fmla="val 50000"/>
+                  </a:avLst>
+                </a:prstGeom>
+                <a:solidFill>
+                  <a:srgbClr val="DCE5F4"/>
+                </a:solidFill>
+                <a:ln w="19050">
+                  <a:solidFill>
+                    <a:schemeClr val="tx1"/>
+                  </a:solidFill>
+                </a:ln>
+              </p:spPr>
+              <p:style>
+                <a:lnRef idx="2">
+                  <a:schemeClr val="accent1">
+                    <a:shade val="50000"/>
+                  </a:schemeClr>
+                </a:lnRef>
+                <a:fillRef idx="1">
+                  <a:schemeClr val="accent1"/>
+                </a:fillRef>
+                <a:effectRef idx="0">
+                  <a:schemeClr val="accent1"/>
+                </a:effectRef>
+                <a:fontRef idx="minor">
+                  <a:schemeClr val="lt1"/>
+                </a:fontRef>
+              </p:style>
+              <p:txBody>
+                <a:bodyPr rtlCol="0" anchor="ctr"/>
+                <a:lstStyle/>
+                <a:p>
+                  <a:pPr algn="ctr"/>
+                  <a:endParaRPr lang="fr-FR"/>
+                </a:p>
+              </p:txBody>
+            </p:sp>
+            <p:sp>
+              <p:nvSpPr>
+                <p:cNvPr id="260" name="Flèche : droite 259">
+                  <a:extLst>
+                    <a:ext uri="{FF2B5EF4-FFF2-40B4-BE49-F238E27FC236}">
+                      <a16:creationId xmlns:a16="http://schemas.microsoft.com/office/drawing/2014/main" id="{9F65CD97-B287-4629-92D6-E3B5152DB110}"/>
+                    </a:ext>
+                  </a:extLst>
+                </p:cNvPr>
+                <p:cNvSpPr/>
+                <p:nvPr/>
+              </p:nvSpPr>
+              <p:spPr>
+                <a:xfrm rot="16200000">
+                  <a:off x="1460890" y="4010046"/>
+                  <a:ext cx="496651" cy="113762"/>
+                </a:xfrm>
+                <a:prstGeom prst="rightArrow">
+                  <a:avLst>
+                    <a:gd name="adj1" fmla="val 50000"/>
+                    <a:gd name="adj2" fmla="val 58725"/>
+                  </a:avLst>
+                </a:prstGeom>
+                <a:solidFill>
+                  <a:schemeClr val="tx1"/>
+                </a:solidFill>
+                <a:ln>
+                  <a:solidFill>
+                    <a:schemeClr val="bg1"/>
+                  </a:solidFill>
+                </a:ln>
+              </p:spPr>
+              <p:style>
+                <a:lnRef idx="2">
+                  <a:schemeClr val="accent1">
+                    <a:shade val="50000"/>
+                  </a:schemeClr>
+                </a:lnRef>
+                <a:fillRef idx="1">
+                  <a:schemeClr val="accent1"/>
+                </a:fillRef>
+                <a:effectRef idx="0">
+                  <a:schemeClr val="accent1"/>
+                </a:effectRef>
+                <a:fontRef idx="minor">
+                  <a:schemeClr val="lt1"/>
+                </a:fontRef>
+              </p:style>
+              <p:txBody>
+                <a:bodyPr rtlCol="0" anchor="ctr"/>
+                <a:lstStyle/>
+                <a:p>
+                  <a:pPr algn="ctr"/>
+                  <a:endParaRPr lang="fr-FR"/>
+                </a:p>
+              </p:txBody>
+            </p:sp>
+          </p:grpSp>
+          <p:sp>
+            <p:nvSpPr>
+              <p:cNvPr id="261" name="ZoneTexte 260">
+                <a:extLst>
+                  <a:ext uri="{FF2B5EF4-FFF2-40B4-BE49-F238E27FC236}">
+                    <a16:creationId xmlns:a16="http://schemas.microsoft.com/office/drawing/2014/main" id="{C4F72258-6673-4A75-9BF1-D14239CB30A1}"/>
+                  </a:ext>
+                </a:extLst>
+              </p:cNvPr>
+              <p:cNvSpPr txBox="1"/>
+              <p:nvPr/>
+            </p:nvSpPr>
+            <p:spPr>
+              <a:xfrm>
+                <a:off x="7517899" y="5491180"/>
+                <a:ext cx="836134" cy="338554"/>
+              </a:xfrm>
+              <a:prstGeom prst="rect">
+                <a:avLst/>
+              </a:prstGeom>
+              <a:noFill/>
+            </p:spPr>
+            <p:txBody>
+              <a:bodyPr wrap="square" rtlCol="0">
+                <a:spAutoFit/>
+              </a:bodyPr>
+              <a:lstStyle/>
+              <a:p>
+                <a:pPr algn="ctr"/>
+                <a:r>
+                  <a:rPr lang="fr-FR" sz="1600" b="1" dirty="0">
+                    <a:ln>
+                      <a:solidFill>
+                        <a:schemeClr val="tx1"/>
+                      </a:solidFill>
+                    </a:ln>
+                    <a:solidFill>
+                      <a:schemeClr val="bg1"/>
+                    </a:solidFill>
+                  </a:rPr>
+                  <a:t>+ 3 cm</a:t>
+                </a:r>
+              </a:p>
+            </p:txBody>
+          </p:sp>
+        </p:grpSp>
+        <p:sp>
+          <p:nvSpPr>
+            <p:cNvPr id="138" name="Rectangle 137">
+              <a:extLst>
+                <a:ext uri="{FF2B5EF4-FFF2-40B4-BE49-F238E27FC236}">
+                  <a16:creationId xmlns:a16="http://schemas.microsoft.com/office/drawing/2014/main" id="{47432A07-4145-405B-AF61-852BD74E3B7E}"/>
+                </a:ext>
+              </a:extLst>
+            </p:cNvPr>
+            <p:cNvSpPr/>
+            <p:nvPr/>
+          </p:nvSpPr>
+          <p:spPr>
+            <a:xfrm>
+              <a:off x="7233380" y="4605192"/>
+              <a:ext cx="1340630" cy="1340630"/>
+            </a:xfrm>
+            <a:prstGeom prst="rect">
+              <a:avLst/>
+            </a:prstGeom>
+            <a:noFill/>
+            <a:ln>
+              <a:noFill/>
+            </a:ln>
+          </p:spPr>
+          <p:style>
+            <a:lnRef idx="2">
+              <a:schemeClr val="accent1">
+                <a:shade val="50000"/>
+              </a:schemeClr>
+            </a:lnRef>
+            <a:fillRef idx="1">
+              <a:schemeClr val="accent1"/>
+            </a:fillRef>
+            <a:effectRef idx="0">
+              <a:schemeClr val="accent1"/>
+            </a:effectRef>
+            <a:fontRef idx="minor">
+              <a:schemeClr val="lt1"/>
+            </a:fontRef>
+          </p:style>
+          <p:txBody>
+            <a:bodyPr rtlCol="0" anchor="ctr"/>
+            <a:lstStyle/>
+            <a:p>
+              <a:pPr algn="ctr"/>
+              <a:endParaRPr lang="fr-FR"/>
+            </a:p>
+          </p:txBody>
+        </p:sp>
+      </p:grpSp>
+      <p:grpSp>
+        <p:nvGrpSpPr>
+          <p:cNvPr id="4" name="Groupe 3">
+            <a:extLst>
+              <a:ext uri="{FF2B5EF4-FFF2-40B4-BE49-F238E27FC236}">
+                <a16:creationId xmlns:a16="http://schemas.microsoft.com/office/drawing/2014/main" id="{34220DF1-04B3-42E5-99EC-90619B9F5156}"/>
+              </a:ext>
+            </a:extLst>
+          </p:cNvPr>
+          <p:cNvGrpSpPr/>
+          <p:nvPr/>
+        </p:nvGrpSpPr>
+        <p:grpSpPr>
+          <a:xfrm>
+            <a:off x="6169069" y="5714778"/>
+            <a:ext cx="1078837" cy="1078837"/>
+            <a:chOff x="6169069" y="5722716"/>
+            <a:chExt cx="1078837" cy="1078837"/>
+          </a:xfrm>
+        </p:grpSpPr>
+        <p:grpSp>
+          <p:nvGrpSpPr>
+            <p:cNvPr id="143" name="Groupe 142">
+              <a:extLst>
+                <a:ext uri="{FF2B5EF4-FFF2-40B4-BE49-F238E27FC236}">
+                  <a16:creationId xmlns:a16="http://schemas.microsoft.com/office/drawing/2014/main" id="{74A74941-E91D-47DE-B369-9F6D98DBDACB}"/>
+                </a:ext>
+              </a:extLst>
+            </p:cNvPr>
+            <p:cNvGrpSpPr/>
+            <p:nvPr/>
+          </p:nvGrpSpPr>
+          <p:grpSpPr>
+            <a:xfrm>
+              <a:off x="6547472" y="5947134"/>
+              <a:ext cx="322031" cy="630000"/>
+              <a:chOff x="1548202" y="3796373"/>
+              <a:chExt cx="322031" cy="630000"/>
+            </a:xfrm>
+          </p:grpSpPr>
+          <p:sp>
+            <p:nvSpPr>
+              <p:cNvPr id="145" name="Cylindre 144">
+                <a:extLst>
+                  <a:ext uri="{FF2B5EF4-FFF2-40B4-BE49-F238E27FC236}">
+                    <a16:creationId xmlns:a16="http://schemas.microsoft.com/office/drawing/2014/main" id="{699D0E33-550B-4A94-80D7-B38773ADBEBE}"/>
+                  </a:ext>
+                </a:extLst>
+              </p:cNvPr>
+              <p:cNvSpPr/>
+              <p:nvPr/>
+            </p:nvSpPr>
+            <p:spPr>
+              <a:xfrm>
+                <a:off x="1548202" y="3796373"/>
+                <a:ext cx="322031" cy="630000"/>
+              </a:xfrm>
+              <a:prstGeom prst="can">
+                <a:avLst/>
+              </a:prstGeom>
+              <a:solidFill>
+                <a:schemeClr val="bg1"/>
+              </a:solidFill>
+              <a:ln w="19050">
+                <a:solidFill>
+                  <a:schemeClr val="tx1"/>
+                </a:solidFill>
+              </a:ln>
+            </p:spPr>
+            <p:style>
+              <a:lnRef idx="2">
+                <a:schemeClr val="accent1">
+                  <a:shade val="50000"/>
+                </a:schemeClr>
+              </a:lnRef>
+              <a:fillRef idx="1">
+                <a:schemeClr val="accent1"/>
+              </a:fillRef>
+              <a:effectRef idx="0">
+                <a:schemeClr val="accent1"/>
+              </a:effectRef>
+              <a:fontRef idx="minor">
+                <a:schemeClr val="lt1"/>
+              </a:fontRef>
+            </p:style>
+            <p:txBody>
+              <a:bodyPr rtlCol="0" anchor="ctr"/>
+              <a:lstStyle/>
+              <a:p>
+                <a:pPr algn="ctr"/>
+                <a:endParaRPr lang="fr-FR"/>
+              </a:p>
+            </p:txBody>
+          </p:sp>
+          <p:sp>
+            <p:nvSpPr>
+              <p:cNvPr id="146" name="Cylindre 145">
+                <a:extLst>
+                  <a:ext uri="{FF2B5EF4-FFF2-40B4-BE49-F238E27FC236}">
+                    <a16:creationId xmlns:a16="http://schemas.microsoft.com/office/drawing/2014/main" id="{30923F25-7782-4A5B-9A90-1949DBA29469}"/>
+                  </a:ext>
+                </a:extLst>
+              </p:cNvPr>
+              <p:cNvSpPr/>
+              <p:nvPr/>
+            </p:nvSpPr>
+            <p:spPr>
+              <a:xfrm>
+                <a:off x="1548202" y="4258099"/>
+                <a:ext cx="322031" cy="168274"/>
+              </a:xfrm>
+              <a:prstGeom prst="can">
+                <a:avLst>
+                  <a:gd name="adj" fmla="val 50000"/>
+                </a:avLst>
+              </a:prstGeom>
+              <a:solidFill>
+                <a:srgbClr val="DCE5F4"/>
+              </a:solidFill>
+              <a:ln w="19050">
+                <a:solidFill>
+                  <a:schemeClr val="tx1"/>
+                </a:solidFill>
+              </a:ln>
+            </p:spPr>
+            <p:style>
+              <a:lnRef idx="2">
+                <a:schemeClr val="accent1">
+                  <a:shade val="50000"/>
+                </a:schemeClr>
+              </a:lnRef>
+              <a:fillRef idx="1">
+                <a:schemeClr val="accent1"/>
+              </a:fillRef>
+              <a:effectRef idx="0">
+                <a:schemeClr val="accent1"/>
+              </a:effectRef>
+              <a:fontRef idx="minor">
+                <a:schemeClr val="lt1"/>
+              </a:fontRef>
+            </p:style>
+            <p:txBody>
+              <a:bodyPr rtlCol="0" anchor="ctr"/>
+              <a:lstStyle/>
+              <a:p>
+                <a:pPr algn="ctr"/>
+                <a:endParaRPr lang="fr-FR" dirty="0"/>
+              </a:p>
+            </p:txBody>
+          </p:sp>
+          <p:sp>
+            <p:nvSpPr>
+              <p:cNvPr id="147" name="Flèche : droite 146">
+                <a:extLst>
+                  <a:ext uri="{FF2B5EF4-FFF2-40B4-BE49-F238E27FC236}">
+                    <a16:creationId xmlns:a16="http://schemas.microsoft.com/office/drawing/2014/main" id="{AFC8E1FB-F41F-4415-8E3B-8D6EDBB65EEF}"/>
+                  </a:ext>
+                </a:extLst>
+              </p:cNvPr>
+              <p:cNvSpPr/>
+              <p:nvPr/>
+            </p:nvSpPr>
+            <p:spPr>
+              <a:xfrm rot="16200000">
+                <a:off x="1460890" y="4010046"/>
+                <a:ext cx="496651" cy="113762"/>
+              </a:xfrm>
+              <a:prstGeom prst="rightArrow">
+                <a:avLst>
+                  <a:gd name="adj1" fmla="val 50000"/>
+                  <a:gd name="adj2" fmla="val 58725"/>
+                </a:avLst>
+              </a:prstGeom>
+              <a:solidFill>
+                <a:schemeClr val="tx1"/>
+              </a:solidFill>
+              <a:ln>
+                <a:solidFill>
+                  <a:schemeClr val="bg1"/>
+                </a:solidFill>
+              </a:ln>
+            </p:spPr>
+            <p:style>
+              <a:lnRef idx="2">
+                <a:schemeClr val="accent1">
+                  <a:shade val="50000"/>
+                </a:schemeClr>
+              </a:lnRef>
+              <a:fillRef idx="1">
+                <a:schemeClr val="accent1"/>
+              </a:fillRef>
+              <a:effectRef idx="0">
+                <a:schemeClr val="accent1"/>
+              </a:effectRef>
+              <a:fontRef idx="minor">
+                <a:schemeClr val="lt1"/>
+              </a:fontRef>
+            </p:style>
+            <p:txBody>
+              <a:bodyPr rtlCol="0" anchor="ctr"/>
+              <a:lstStyle/>
+              <a:p>
+                <a:pPr algn="ctr"/>
+                <a:endParaRPr lang="fr-FR" dirty="0"/>
+              </a:p>
+            </p:txBody>
+          </p:sp>
+        </p:grpSp>
+        <p:sp>
+          <p:nvSpPr>
+            <p:cNvPr id="142" name="Rectangle 141">
+              <a:extLst>
+                <a:ext uri="{FF2B5EF4-FFF2-40B4-BE49-F238E27FC236}">
+                  <a16:creationId xmlns:a16="http://schemas.microsoft.com/office/drawing/2014/main" id="{4E697776-B480-460B-9C72-6795CE8D3D44}"/>
+                </a:ext>
+              </a:extLst>
+            </p:cNvPr>
+            <p:cNvSpPr/>
+            <p:nvPr/>
+          </p:nvSpPr>
+          <p:spPr>
+            <a:xfrm>
+              <a:off x="6169069" y="5722716"/>
+              <a:ext cx="1078837" cy="1078837"/>
+            </a:xfrm>
+            <a:prstGeom prst="rect">
+              <a:avLst/>
+            </a:prstGeom>
+            <a:noFill/>
+            <a:ln>
+              <a:noFill/>
+            </a:ln>
+          </p:spPr>
+          <p:style>
+            <a:lnRef idx="2">
+              <a:schemeClr val="accent1">
+                <a:shade val="50000"/>
+              </a:schemeClr>
+            </a:lnRef>
+            <a:fillRef idx="1">
+              <a:schemeClr val="accent1"/>
+            </a:fillRef>
+            <a:effectRef idx="0">
+              <a:schemeClr val="accent1"/>
+            </a:effectRef>
+            <a:fontRef idx="minor">
+              <a:schemeClr val="lt1"/>
+            </a:fontRef>
+          </p:style>
+          <p:txBody>
+            <a:bodyPr rtlCol="0" anchor="ctr"/>
+            <a:lstStyle/>
+            <a:p>
+              <a:pPr algn="ctr"/>
+              <a:endParaRPr lang="fr-FR"/>
+            </a:p>
+          </p:txBody>
+        </p:sp>
+      </p:grpSp>
+      <p:grpSp>
+        <p:nvGrpSpPr>
+          <p:cNvPr id="5" name="Groupe 4">
+            <a:extLst>
+              <a:ext uri="{FF2B5EF4-FFF2-40B4-BE49-F238E27FC236}">
+                <a16:creationId xmlns:a16="http://schemas.microsoft.com/office/drawing/2014/main" id="{B48E7F89-C605-43E1-8B31-10AC777D73FE}"/>
+              </a:ext>
+            </a:extLst>
+          </p:cNvPr>
+          <p:cNvGrpSpPr/>
+          <p:nvPr/>
+        </p:nvGrpSpPr>
+        <p:grpSpPr>
+          <a:xfrm>
+            <a:off x="7141218" y="5714778"/>
+            <a:ext cx="1078837" cy="1078837"/>
+            <a:chOff x="7116278" y="5695781"/>
+            <a:chExt cx="1078837" cy="1078837"/>
+          </a:xfrm>
+        </p:grpSpPr>
+        <p:sp>
+          <p:nvSpPr>
+            <p:cNvPr id="264" name="Rectangle 263">
+              <a:extLst>
+                <a:ext uri="{FF2B5EF4-FFF2-40B4-BE49-F238E27FC236}">
+                  <a16:creationId xmlns:a16="http://schemas.microsoft.com/office/drawing/2014/main" id="{8FE9F387-7453-4AA1-802B-86D62A4D7967}"/>
+                </a:ext>
+              </a:extLst>
+            </p:cNvPr>
+            <p:cNvSpPr/>
+            <p:nvPr/>
+          </p:nvSpPr>
+          <p:spPr>
+            <a:xfrm>
+              <a:off x="7116278" y="5695781"/>
+              <a:ext cx="1078837" cy="1078837"/>
+            </a:xfrm>
+            <a:prstGeom prst="rect">
+              <a:avLst/>
+            </a:prstGeom>
+            <a:noFill/>
+            <a:ln>
+              <a:noFill/>
+            </a:ln>
+          </p:spPr>
+          <p:style>
+            <a:lnRef idx="2">
+              <a:schemeClr val="accent1">
+                <a:shade val="50000"/>
+              </a:schemeClr>
+            </a:lnRef>
+            <a:fillRef idx="1">
+              <a:schemeClr val="accent1"/>
+            </a:fillRef>
+            <a:effectRef idx="0">
+              <a:schemeClr val="accent1"/>
+            </a:effectRef>
+            <a:fontRef idx="minor">
+              <a:schemeClr val="lt1"/>
+            </a:fontRef>
+          </p:style>
+          <p:txBody>
+            <a:bodyPr rtlCol="0" anchor="ctr"/>
+            <a:lstStyle/>
+            <a:p>
+              <a:pPr algn="ctr"/>
+              <a:endParaRPr lang="fr-FR"/>
+            </a:p>
+          </p:txBody>
+        </p:sp>
+        <p:grpSp>
+          <p:nvGrpSpPr>
+            <p:cNvPr id="272" name="Groupe 271">
+              <a:extLst>
+                <a:ext uri="{FF2B5EF4-FFF2-40B4-BE49-F238E27FC236}">
+                  <a16:creationId xmlns:a16="http://schemas.microsoft.com/office/drawing/2014/main" id="{B8D9016C-1F7C-493D-B0F4-CDDEAE9DED98}"/>
+                </a:ext>
+              </a:extLst>
+            </p:cNvPr>
+            <p:cNvGrpSpPr/>
+            <p:nvPr/>
+          </p:nvGrpSpPr>
+          <p:grpSpPr>
+            <a:xfrm>
+              <a:off x="7494681" y="5920199"/>
+              <a:ext cx="322031" cy="630000"/>
+              <a:chOff x="1548202" y="3796373"/>
+              <a:chExt cx="322031" cy="630000"/>
+            </a:xfrm>
+          </p:grpSpPr>
+          <p:sp>
+            <p:nvSpPr>
+              <p:cNvPr id="273" name="Cylindre 272">
+                <a:extLst>
+                  <a:ext uri="{FF2B5EF4-FFF2-40B4-BE49-F238E27FC236}">
+                    <a16:creationId xmlns:a16="http://schemas.microsoft.com/office/drawing/2014/main" id="{20E2AF45-8ECC-40A0-904F-25E05F06B6F1}"/>
+                  </a:ext>
+                </a:extLst>
+              </p:cNvPr>
+              <p:cNvSpPr/>
+              <p:nvPr/>
+            </p:nvSpPr>
+            <p:spPr>
+              <a:xfrm>
+                <a:off x="1548202" y="3796373"/>
+                <a:ext cx="322031" cy="630000"/>
+              </a:xfrm>
+              <a:prstGeom prst="can">
+                <a:avLst/>
+              </a:prstGeom>
+              <a:solidFill>
+                <a:srgbClr val="C5D4EC"/>
+              </a:solidFill>
+              <a:ln w="19050">
+                <a:solidFill>
+                  <a:schemeClr val="tx1"/>
+                </a:solidFill>
+              </a:ln>
+            </p:spPr>
+            <p:style>
+              <a:lnRef idx="2">
+                <a:schemeClr val="accent1">
+                  <a:shade val="50000"/>
+                </a:schemeClr>
+              </a:lnRef>
+              <a:fillRef idx="1">
+                <a:schemeClr val="accent1"/>
+              </a:fillRef>
+              <a:effectRef idx="0">
+                <a:schemeClr val="accent1"/>
+              </a:effectRef>
+              <a:fontRef idx="minor">
+                <a:schemeClr val="lt1"/>
+              </a:fontRef>
+            </p:style>
+            <p:txBody>
+              <a:bodyPr rtlCol="0" anchor="ctr"/>
+              <a:lstStyle/>
+              <a:p>
+                <a:pPr algn="ctr"/>
+                <a:endParaRPr lang="fr-FR"/>
+              </a:p>
+            </p:txBody>
+          </p:sp>
+          <p:sp>
+            <p:nvSpPr>
+              <p:cNvPr id="274" name="Cylindre 273">
+                <a:extLst>
+                  <a:ext uri="{FF2B5EF4-FFF2-40B4-BE49-F238E27FC236}">
+                    <a16:creationId xmlns:a16="http://schemas.microsoft.com/office/drawing/2014/main" id="{6F27CACA-5EC1-42DD-B847-8962B1385791}"/>
+                  </a:ext>
+                </a:extLst>
+              </p:cNvPr>
+              <p:cNvSpPr/>
+              <p:nvPr/>
+            </p:nvSpPr>
+            <p:spPr>
+              <a:xfrm>
+                <a:off x="1548202" y="4258099"/>
+                <a:ext cx="322031" cy="168274"/>
+              </a:xfrm>
+              <a:prstGeom prst="can">
+                <a:avLst>
+                  <a:gd name="adj" fmla="val 50000"/>
+                </a:avLst>
+              </a:prstGeom>
+              <a:solidFill>
+                <a:schemeClr val="bg1"/>
+              </a:solidFill>
+              <a:ln w="19050">
+                <a:solidFill>
+                  <a:schemeClr val="tx1"/>
+                </a:solidFill>
+              </a:ln>
+            </p:spPr>
+            <p:style>
+              <a:lnRef idx="2">
+                <a:schemeClr val="accent1">
+                  <a:shade val="50000"/>
+                </a:schemeClr>
+              </a:lnRef>
+              <a:fillRef idx="1">
+                <a:schemeClr val="accent1"/>
+              </a:fillRef>
+              <a:effectRef idx="0">
+                <a:schemeClr val="accent1"/>
+              </a:effectRef>
+              <a:fontRef idx="minor">
+                <a:schemeClr val="lt1"/>
+              </a:fontRef>
+            </p:style>
+            <p:txBody>
+              <a:bodyPr rtlCol="0" anchor="ctr"/>
+              <a:lstStyle/>
+              <a:p>
+                <a:pPr algn="ctr"/>
+                <a:endParaRPr lang="fr-FR"/>
+              </a:p>
+            </p:txBody>
+          </p:sp>
+          <p:sp>
+            <p:nvSpPr>
+              <p:cNvPr id="275" name="Flèche : droite 274">
+                <a:extLst>
+                  <a:ext uri="{FF2B5EF4-FFF2-40B4-BE49-F238E27FC236}">
+                    <a16:creationId xmlns:a16="http://schemas.microsoft.com/office/drawing/2014/main" id="{262C1B99-1AE6-4AC9-A08F-A52B573F579D}"/>
+                  </a:ext>
+                </a:extLst>
+              </p:cNvPr>
+              <p:cNvSpPr/>
+              <p:nvPr/>
+            </p:nvSpPr>
+            <p:spPr>
+              <a:xfrm rot="5400000">
+                <a:off x="1460890" y="4010046"/>
+                <a:ext cx="496651" cy="113762"/>
+              </a:xfrm>
+              <a:prstGeom prst="rightArrow">
+                <a:avLst>
+                  <a:gd name="adj1" fmla="val 50000"/>
+                  <a:gd name="adj2" fmla="val 58725"/>
+                </a:avLst>
+              </a:prstGeom>
+              <a:solidFill>
+                <a:schemeClr val="tx1"/>
+              </a:solidFill>
+              <a:ln>
+                <a:solidFill>
+                  <a:schemeClr val="bg1"/>
+                </a:solidFill>
+              </a:ln>
+            </p:spPr>
+            <p:style>
+              <a:lnRef idx="2">
+                <a:schemeClr val="accent1">
+                  <a:shade val="50000"/>
+                </a:schemeClr>
+              </a:lnRef>
+              <a:fillRef idx="1">
+                <a:schemeClr val="accent1"/>
+              </a:fillRef>
+              <a:effectRef idx="0">
+                <a:schemeClr val="accent1"/>
+              </a:effectRef>
+              <a:fontRef idx="minor">
+                <a:schemeClr val="lt1"/>
+              </a:fontRef>
+            </p:style>
+            <p:txBody>
+              <a:bodyPr rtlCol="0" anchor="ctr"/>
+              <a:lstStyle/>
+              <a:p>
+                <a:pPr algn="ctr"/>
+                <a:endParaRPr lang="fr-FR" dirty="0"/>
+              </a:p>
+            </p:txBody>
+          </p:sp>
+        </p:grpSp>
+      </p:grpSp>
+      <p:grpSp>
+        <p:nvGrpSpPr>
+          <p:cNvPr id="276" name="Groupe 275">
+            <a:extLst>
+              <a:ext uri="{FF2B5EF4-FFF2-40B4-BE49-F238E27FC236}">
+                <a16:creationId xmlns:a16="http://schemas.microsoft.com/office/drawing/2014/main" id="{39783797-274A-40BF-998E-7F679F369C0C}"/>
+              </a:ext>
+            </a:extLst>
+          </p:cNvPr>
+          <p:cNvGrpSpPr/>
+          <p:nvPr/>
+        </p:nvGrpSpPr>
+        <p:grpSpPr>
+          <a:xfrm>
+            <a:off x="7990584" y="5768708"/>
+            <a:ext cx="1078837" cy="1078837"/>
+            <a:chOff x="6169069" y="5722716"/>
+            <a:chExt cx="1078837" cy="1078837"/>
+          </a:xfrm>
+        </p:grpSpPr>
+        <p:grpSp>
+          <p:nvGrpSpPr>
+            <p:cNvPr id="277" name="Groupe 276">
+              <a:extLst>
+                <a:ext uri="{FF2B5EF4-FFF2-40B4-BE49-F238E27FC236}">
+                  <a16:creationId xmlns:a16="http://schemas.microsoft.com/office/drawing/2014/main" id="{6839DE50-D667-4B53-953B-A326C74F4492}"/>
+                </a:ext>
+              </a:extLst>
+            </p:cNvPr>
+            <p:cNvGrpSpPr/>
+            <p:nvPr/>
+          </p:nvGrpSpPr>
+          <p:grpSpPr>
+            <a:xfrm>
+              <a:off x="6547472" y="5947134"/>
+              <a:ext cx="322031" cy="630000"/>
+              <a:chOff x="1548202" y="3796373"/>
+              <a:chExt cx="322031" cy="630000"/>
+            </a:xfrm>
+          </p:grpSpPr>
+          <p:sp>
+            <p:nvSpPr>
+              <p:cNvPr id="279" name="Cylindre 278">
+                <a:extLst>
+                  <a:ext uri="{FF2B5EF4-FFF2-40B4-BE49-F238E27FC236}">
+                    <a16:creationId xmlns:a16="http://schemas.microsoft.com/office/drawing/2014/main" id="{4F78AF1E-40BE-4F4B-9CA1-4FB9A0C52239}"/>
+                  </a:ext>
+                </a:extLst>
+              </p:cNvPr>
+              <p:cNvSpPr/>
+              <p:nvPr/>
+            </p:nvSpPr>
+            <p:spPr>
+              <a:xfrm>
+                <a:off x="1548202" y="3796373"/>
+                <a:ext cx="322031" cy="630000"/>
+              </a:xfrm>
+              <a:prstGeom prst="can">
+                <a:avLst/>
+              </a:prstGeom>
+              <a:noFill/>
+              <a:ln w="19050">
+                <a:solidFill>
+                  <a:schemeClr val="tx1"/>
+                </a:solidFill>
+              </a:ln>
+            </p:spPr>
+            <p:style>
+              <a:lnRef idx="2">
+                <a:schemeClr val="accent1">
+                  <a:shade val="50000"/>
+                </a:schemeClr>
+              </a:lnRef>
+              <a:fillRef idx="1">
+                <a:schemeClr val="accent1"/>
+              </a:fillRef>
+              <a:effectRef idx="0">
+                <a:schemeClr val="accent1"/>
+              </a:effectRef>
+              <a:fontRef idx="minor">
+                <a:schemeClr val="lt1"/>
+              </a:fontRef>
+            </p:style>
+            <p:txBody>
+              <a:bodyPr rtlCol="0" anchor="ctr"/>
+              <a:lstStyle/>
+              <a:p>
+                <a:pPr algn="ctr"/>
+                <a:endParaRPr lang="fr-FR"/>
+              </a:p>
+            </p:txBody>
+          </p:sp>
+          <p:sp>
+            <p:nvSpPr>
+              <p:cNvPr id="280" name="Cylindre 279">
+                <a:extLst>
+                  <a:ext uri="{FF2B5EF4-FFF2-40B4-BE49-F238E27FC236}">
+                    <a16:creationId xmlns:a16="http://schemas.microsoft.com/office/drawing/2014/main" id="{C4871CDD-8333-41EF-A512-EF343BC85441}"/>
+                  </a:ext>
+                </a:extLst>
+              </p:cNvPr>
+              <p:cNvSpPr/>
+              <p:nvPr/>
+            </p:nvSpPr>
+            <p:spPr>
+              <a:xfrm>
+                <a:off x="1548202" y="4258099"/>
+                <a:ext cx="322031" cy="168274"/>
+              </a:xfrm>
+              <a:prstGeom prst="can">
+                <a:avLst>
+                  <a:gd name="adj" fmla="val 50000"/>
+                </a:avLst>
+              </a:prstGeom>
+              <a:solidFill>
+                <a:schemeClr val="bg1"/>
+              </a:solidFill>
+              <a:ln w="19050">
+                <a:solidFill>
+                  <a:schemeClr val="tx1"/>
+                </a:solidFill>
+              </a:ln>
+            </p:spPr>
+            <p:style>
+              <a:lnRef idx="2">
+                <a:schemeClr val="accent1">
+                  <a:shade val="50000"/>
+                </a:schemeClr>
+              </a:lnRef>
+              <a:fillRef idx="1">
+                <a:schemeClr val="accent1"/>
+              </a:fillRef>
+              <a:effectRef idx="0">
+                <a:schemeClr val="accent1"/>
+              </a:effectRef>
+              <a:fontRef idx="minor">
+                <a:schemeClr val="lt1"/>
+              </a:fontRef>
+            </p:style>
+            <p:txBody>
+              <a:bodyPr rtlCol="0" anchor="ctr"/>
+              <a:lstStyle/>
+              <a:p>
+                <a:pPr algn="ctr"/>
+                <a:endParaRPr lang="fr-FR" dirty="0"/>
+              </a:p>
+            </p:txBody>
+          </p:sp>
+          <p:sp>
+            <p:nvSpPr>
+              <p:cNvPr id="281" name="Flèche : droite 280">
+                <a:extLst>
+                  <a:ext uri="{FF2B5EF4-FFF2-40B4-BE49-F238E27FC236}">
+                    <a16:creationId xmlns:a16="http://schemas.microsoft.com/office/drawing/2014/main" id="{B62F5EC0-C661-4B7E-94FB-51BE85CAB57A}"/>
+                  </a:ext>
+                </a:extLst>
+              </p:cNvPr>
+              <p:cNvSpPr/>
+              <p:nvPr/>
+            </p:nvSpPr>
+            <p:spPr>
+              <a:xfrm rot="16200000">
+                <a:off x="1460890" y="3972171"/>
+                <a:ext cx="496651" cy="189512"/>
+              </a:xfrm>
+              <a:prstGeom prst="rightArrow">
+                <a:avLst>
+                  <a:gd name="adj1" fmla="val 50000"/>
+                  <a:gd name="adj2" fmla="val 58725"/>
+                </a:avLst>
+              </a:prstGeom>
+              <a:solidFill>
+                <a:schemeClr val="tx1"/>
+              </a:solidFill>
+              <a:ln>
+                <a:solidFill>
+                  <a:schemeClr val="bg1"/>
+                </a:solidFill>
+              </a:ln>
+            </p:spPr>
+            <p:style>
+              <a:lnRef idx="2">
+                <a:schemeClr val="accent1">
+                  <a:shade val="50000"/>
+                </a:schemeClr>
+              </a:lnRef>
+              <a:fillRef idx="1">
+                <a:schemeClr val="accent1"/>
+              </a:fillRef>
+              <a:effectRef idx="0">
+                <a:schemeClr val="accent1"/>
+              </a:effectRef>
+              <a:fontRef idx="minor">
+                <a:schemeClr val="lt1"/>
+              </a:fontRef>
+            </p:style>
+            <p:txBody>
+              <a:bodyPr rtlCol="0" anchor="ctr"/>
+              <a:lstStyle/>
+              <a:p>
+                <a:pPr algn="ctr"/>
+                <a:endParaRPr lang="fr-FR" dirty="0"/>
+              </a:p>
+            </p:txBody>
+          </p:sp>
+        </p:grpSp>
+        <p:sp>
+          <p:nvSpPr>
+            <p:cNvPr id="278" name="Rectangle 277">
+              <a:extLst>
+                <a:ext uri="{FF2B5EF4-FFF2-40B4-BE49-F238E27FC236}">
+                  <a16:creationId xmlns:a16="http://schemas.microsoft.com/office/drawing/2014/main" id="{952F2A19-02D9-4E97-A1BA-E141B5468482}"/>
+                </a:ext>
+              </a:extLst>
+            </p:cNvPr>
+            <p:cNvSpPr/>
+            <p:nvPr/>
+          </p:nvSpPr>
+          <p:spPr>
+            <a:xfrm>
+              <a:off x="6169069" y="5722716"/>
+              <a:ext cx="1078837" cy="1078837"/>
+            </a:xfrm>
+            <a:prstGeom prst="rect">
+              <a:avLst/>
+            </a:prstGeom>
+            <a:noFill/>
+            <a:ln>
+              <a:noFill/>
+            </a:ln>
+          </p:spPr>
+          <p:style>
+            <a:lnRef idx="2">
+              <a:schemeClr val="accent1">
+                <a:shade val="50000"/>
+              </a:schemeClr>
+            </a:lnRef>
+            <a:fillRef idx="1">
+              <a:schemeClr val="accent1"/>
+            </a:fillRef>
+            <a:effectRef idx="0">
+              <a:schemeClr val="accent1"/>
+            </a:effectRef>
+            <a:fontRef idx="minor">
+              <a:schemeClr val="lt1"/>
+            </a:fontRef>
+          </p:style>
+          <p:txBody>
+            <a:bodyPr rtlCol="0" anchor="ctr"/>
+            <a:lstStyle/>
+            <a:p>
+              <a:pPr algn="ctr"/>
+              <a:endParaRPr lang="fr-FR"/>
+            </a:p>
+          </p:txBody>
+        </p:sp>
+      </p:grpSp>
+      <p:grpSp>
+        <p:nvGrpSpPr>
+          <p:cNvPr id="7" name="Groupe 6">
+            <a:extLst>
+              <a:ext uri="{FF2B5EF4-FFF2-40B4-BE49-F238E27FC236}">
+                <a16:creationId xmlns:a16="http://schemas.microsoft.com/office/drawing/2014/main" id="{C88CB88E-60A5-40AC-B9BA-2D49A02E8B22}"/>
+              </a:ext>
+            </a:extLst>
+          </p:cNvPr>
+          <p:cNvGrpSpPr/>
+          <p:nvPr/>
+        </p:nvGrpSpPr>
+        <p:grpSpPr>
+          <a:xfrm>
+            <a:off x="8962733" y="5768708"/>
+            <a:ext cx="1078837" cy="1078837"/>
+            <a:chOff x="8962733" y="5768708"/>
+            <a:chExt cx="1078837" cy="1078837"/>
+          </a:xfrm>
+        </p:grpSpPr>
+        <p:sp>
+          <p:nvSpPr>
+            <p:cNvPr id="283" name="Rectangle 282">
+              <a:extLst>
+                <a:ext uri="{FF2B5EF4-FFF2-40B4-BE49-F238E27FC236}">
+                  <a16:creationId xmlns:a16="http://schemas.microsoft.com/office/drawing/2014/main" id="{517C7140-2ADA-44C4-923E-AC7DA0185034}"/>
+                </a:ext>
+              </a:extLst>
+            </p:cNvPr>
+            <p:cNvSpPr/>
+            <p:nvPr/>
+          </p:nvSpPr>
+          <p:spPr>
+            <a:xfrm>
+              <a:off x="8962733" y="5768708"/>
+              <a:ext cx="1078837" cy="1078837"/>
+            </a:xfrm>
+            <a:prstGeom prst="rect">
+              <a:avLst/>
+            </a:prstGeom>
+            <a:noFill/>
+            <a:ln>
+              <a:noFill/>
+            </a:ln>
+          </p:spPr>
+          <p:style>
+            <a:lnRef idx="2">
+              <a:schemeClr val="accent1">
+                <a:shade val="50000"/>
+              </a:schemeClr>
+            </a:lnRef>
+            <a:fillRef idx="1">
+              <a:schemeClr val="accent1"/>
+            </a:fillRef>
+            <a:effectRef idx="0">
+              <a:schemeClr val="accent1"/>
+            </a:effectRef>
+            <a:fontRef idx="minor">
+              <a:schemeClr val="lt1"/>
+            </a:fontRef>
+          </p:style>
+          <p:txBody>
+            <a:bodyPr rtlCol="0" anchor="ctr"/>
+            <a:lstStyle/>
+            <a:p>
+              <a:pPr algn="ctr"/>
+              <a:endParaRPr lang="fr-FR"/>
+            </a:p>
+          </p:txBody>
+        </p:sp>
+        <p:grpSp>
+          <p:nvGrpSpPr>
+            <p:cNvPr id="6" name="Groupe 5">
+              <a:extLst>
+                <a:ext uri="{FF2B5EF4-FFF2-40B4-BE49-F238E27FC236}">
+                  <a16:creationId xmlns:a16="http://schemas.microsoft.com/office/drawing/2014/main" id="{7AC4DB1D-5E16-410A-B908-6E77DECBB1F7}"/>
+                </a:ext>
+              </a:extLst>
+            </p:cNvPr>
+            <p:cNvGrpSpPr/>
+            <p:nvPr/>
+          </p:nvGrpSpPr>
+          <p:grpSpPr>
+            <a:xfrm>
+              <a:off x="9341136" y="5993126"/>
+              <a:ext cx="322031" cy="630000"/>
+              <a:chOff x="9341136" y="5993126"/>
+              <a:chExt cx="322031" cy="630000"/>
+            </a:xfrm>
+          </p:grpSpPr>
+          <p:sp>
+            <p:nvSpPr>
+              <p:cNvPr id="285" name="Cylindre 284">
+                <a:extLst>
+                  <a:ext uri="{FF2B5EF4-FFF2-40B4-BE49-F238E27FC236}">
+                    <a16:creationId xmlns:a16="http://schemas.microsoft.com/office/drawing/2014/main" id="{B285A1A2-899F-4D5B-8C3F-42A615C13360}"/>
+                  </a:ext>
+                </a:extLst>
+              </p:cNvPr>
+              <p:cNvSpPr/>
+              <p:nvPr/>
+            </p:nvSpPr>
+            <p:spPr>
+              <a:xfrm>
+                <a:off x="9341136" y="5993126"/>
+                <a:ext cx="322031" cy="630000"/>
+              </a:xfrm>
+              <a:prstGeom prst="can">
+                <a:avLst/>
+              </a:prstGeom>
+              <a:noFill/>
+              <a:ln w="19050">
+                <a:solidFill>
+                  <a:schemeClr val="tx1"/>
+                </a:solidFill>
+              </a:ln>
+            </p:spPr>
+            <p:style>
+              <a:lnRef idx="2">
+                <a:schemeClr val="accent1">
+                  <a:shade val="50000"/>
+                </a:schemeClr>
+              </a:lnRef>
+              <a:fillRef idx="1">
+                <a:schemeClr val="accent1"/>
+              </a:fillRef>
+              <a:effectRef idx="0">
+                <a:schemeClr val="accent1"/>
+              </a:effectRef>
+              <a:fontRef idx="minor">
+                <a:schemeClr val="lt1"/>
+              </a:fontRef>
+            </p:style>
+            <p:txBody>
+              <a:bodyPr rtlCol="0" anchor="ctr"/>
+              <a:lstStyle/>
+              <a:p>
+                <a:pPr algn="ctr"/>
+                <a:endParaRPr lang="fr-FR" dirty="0"/>
+              </a:p>
+            </p:txBody>
+          </p:sp>
+          <p:sp>
+            <p:nvSpPr>
+              <p:cNvPr id="286" name="Cylindre 285">
+                <a:extLst>
+                  <a:ext uri="{FF2B5EF4-FFF2-40B4-BE49-F238E27FC236}">
+                    <a16:creationId xmlns:a16="http://schemas.microsoft.com/office/drawing/2014/main" id="{D8F4FA28-439E-4B68-8877-9FDF558DAFFC}"/>
+                  </a:ext>
+                </a:extLst>
+              </p:cNvPr>
+              <p:cNvSpPr/>
+              <p:nvPr/>
+            </p:nvSpPr>
+            <p:spPr>
+              <a:xfrm>
+                <a:off x="9341136" y="6454852"/>
+                <a:ext cx="322031" cy="168274"/>
+              </a:xfrm>
+              <a:prstGeom prst="can">
+                <a:avLst>
+                  <a:gd name="adj" fmla="val 50000"/>
+                </a:avLst>
+              </a:prstGeom>
+              <a:solidFill>
+                <a:schemeClr val="bg1"/>
+              </a:solidFill>
+              <a:ln w="19050">
+                <a:solidFill>
+                  <a:schemeClr val="tx1"/>
+                </a:solidFill>
+              </a:ln>
+            </p:spPr>
+            <p:style>
+              <a:lnRef idx="2">
+                <a:schemeClr val="accent1">
+                  <a:shade val="50000"/>
+                </a:schemeClr>
+              </a:lnRef>
+              <a:fillRef idx="1">
+                <a:schemeClr val="accent1"/>
+              </a:fillRef>
+              <a:effectRef idx="0">
+                <a:schemeClr val="accent1"/>
+              </a:effectRef>
+              <a:fontRef idx="minor">
+                <a:schemeClr val="lt1"/>
+              </a:fontRef>
+            </p:style>
+            <p:txBody>
+              <a:bodyPr rtlCol="0" anchor="ctr"/>
+              <a:lstStyle/>
+              <a:p>
+                <a:pPr algn="ctr"/>
+                <a:endParaRPr lang="fr-FR"/>
+              </a:p>
+            </p:txBody>
+          </p:sp>
+          <p:sp>
+            <p:nvSpPr>
+              <p:cNvPr id="287" name="Flèche : droite 286">
+                <a:extLst>
+                  <a:ext uri="{FF2B5EF4-FFF2-40B4-BE49-F238E27FC236}">
+                    <a16:creationId xmlns:a16="http://schemas.microsoft.com/office/drawing/2014/main" id="{20DE48BD-EC31-4AC2-A241-41567C38BEDE}"/>
+                  </a:ext>
+                </a:extLst>
+              </p:cNvPr>
+              <p:cNvSpPr/>
+              <p:nvPr/>
+            </p:nvSpPr>
+            <p:spPr>
+              <a:xfrm rot="5400000">
+                <a:off x="9253826" y="6168282"/>
+                <a:ext cx="496651" cy="190800"/>
+              </a:xfrm>
+              <a:prstGeom prst="rightArrow">
+                <a:avLst>
+                  <a:gd name="adj1" fmla="val 50000"/>
+                  <a:gd name="adj2" fmla="val 58725"/>
+                </a:avLst>
+              </a:prstGeom>
+              <a:solidFill>
+                <a:schemeClr val="tx1"/>
+              </a:solidFill>
+              <a:ln>
+                <a:solidFill>
+                  <a:schemeClr val="bg1"/>
+                </a:solidFill>
+              </a:ln>
+            </p:spPr>
+            <p:style>
+              <a:lnRef idx="2">
+                <a:schemeClr val="accent1">
+                  <a:shade val="50000"/>
+                </a:schemeClr>
+              </a:lnRef>
+              <a:fillRef idx="1">
+                <a:schemeClr val="accent1"/>
+              </a:fillRef>
+              <a:effectRef idx="0">
+                <a:schemeClr val="accent1"/>
+              </a:effectRef>
+              <a:fontRef idx="minor">
+                <a:schemeClr val="lt1"/>
+              </a:fontRef>
+            </p:style>
+            <p:txBody>
+              <a:bodyPr rtlCol="0" anchor="ctr"/>
+              <a:lstStyle/>
+              <a:p>
+                <a:pPr algn="ctr"/>
+                <a:endParaRPr lang="fr-FR" dirty="0"/>
+              </a:p>
+            </p:txBody>
+          </p:sp>
+        </p:grpSp>
+      </p:grpSp>
     </p:spTree>
     <p:extLst>
       <p:ext uri="{BB962C8B-B14F-4D97-AF65-F5344CB8AC3E}">

</xml_diff>